<commit_message>
Update - Textos nos SPs
</commit_message>
<xml_diff>
--- a/Qualidade de Software e Governança de TI/NAC1 - CMMI/NAC1.pptx
+++ b/Qualidade de Software e Governança de TI/NAC1 - CMMI/NAC1.pptx
@@ -7115,29 +7115,29 @@
     </dgm:pt>
   </dgm:ptLst>
   <dgm:cxnLst>
+    <dgm:cxn modelId="{1EC265EC-6DEF-4609-A98A-B9CCB15258B3}" type="presOf" srcId="{D68FB0A1-64AF-4719-89C0-1735534AEBB3}" destId="{689B2ECA-B910-4525-96D0-2E5738D025FB}" srcOrd="0" destOrd="0" presId="urn:microsoft.com/office/officeart/2005/8/layout/radial1"/>
+    <dgm:cxn modelId="{DDC635BF-E9FF-4F6A-BAEB-227541F64C87}" type="presOf" srcId="{8AA4E754-3065-44F5-9AA8-EF9AEDF6D0CC}" destId="{54647140-69E4-41A6-A8C6-AB935EBE7A65}" srcOrd="0" destOrd="0" presId="urn:microsoft.com/office/officeart/2005/8/layout/radial1"/>
+    <dgm:cxn modelId="{17C1CA81-EFCF-4500-99A2-70B48D403800}" type="presOf" srcId="{E8090202-8229-492D-BC32-089543CCF403}" destId="{0A0683A7-FFDC-4669-BD40-6CB23803F38E}" srcOrd="1" destOrd="0" presId="urn:microsoft.com/office/officeart/2005/8/layout/radial1"/>
+    <dgm:cxn modelId="{D9DDA6FC-B3AF-42F0-885F-BC9324E7B391}" srcId="{E285215F-F7D3-426D-869F-A205F1C4BF2E}" destId="{2D019032-8DF9-427F-9EED-A44F575B2797}" srcOrd="0" destOrd="0" parTransId="{8AA4E754-3065-44F5-9AA8-EF9AEDF6D0CC}" sibTransId="{30EE830B-DF74-41F0-84DB-53F31DAABAD3}"/>
+    <dgm:cxn modelId="{565C1A81-D57D-4582-97F9-EBA3B9C066AA}" type="presOf" srcId="{42D28648-708A-480E-87B5-ED6BB14FCE43}" destId="{004EB149-5DCA-4BB3-966A-0CD4E4B3D794}" srcOrd="0" destOrd="0" presId="urn:microsoft.com/office/officeart/2005/8/layout/radial1"/>
+    <dgm:cxn modelId="{CB7DF784-AF03-4345-92B8-EA0334A5B7FE}" type="presOf" srcId="{97BDDB0E-7BB4-40F0-B54F-BD037FA1B902}" destId="{2EC2BD0D-C97D-41AD-AE96-03BDFEBCF029}" srcOrd="1" destOrd="0" presId="urn:microsoft.com/office/officeart/2005/8/layout/radial1"/>
+    <dgm:cxn modelId="{477001B9-F0FC-4A08-B9D6-C0281089D8F3}" type="presOf" srcId="{97BDDB0E-7BB4-40F0-B54F-BD037FA1B902}" destId="{B3663269-5A54-41DC-AC8E-9D1288DD3DD7}" srcOrd="0" destOrd="0" presId="urn:microsoft.com/office/officeart/2005/8/layout/radial1"/>
+    <dgm:cxn modelId="{23D40415-107F-48A9-A42D-6F72DA38CB6D}" type="presOf" srcId="{13BDC813-0B90-48F6-A0DA-2BF83E4323AC}" destId="{4478A666-3F40-47DC-9706-1A123FB90CD7}" srcOrd="0" destOrd="0" presId="urn:microsoft.com/office/officeart/2005/8/layout/radial1"/>
+    <dgm:cxn modelId="{5D2E581C-9A3C-4C7B-8DB9-0B388BCA1B6F}" srcId="{E285215F-F7D3-426D-869F-A205F1C4BF2E}" destId="{D68FB0A1-64AF-4719-89C0-1735534AEBB3}" srcOrd="4" destOrd="0" parTransId="{97BDDB0E-7BB4-40F0-B54F-BD037FA1B902}" sibTransId="{CA0EB4F4-2857-4F3B-B099-390373A5912F}"/>
+    <dgm:cxn modelId="{4E45A5E4-3491-4C53-85D5-EB0A6F589374}" srcId="{E285215F-F7D3-426D-869F-A205F1C4BF2E}" destId="{13BDC813-0B90-48F6-A0DA-2BF83E4323AC}" srcOrd="1" destOrd="0" parTransId="{E8090202-8229-492D-BC32-089543CCF403}" sibTransId="{430D8C41-AA6A-488F-A2C6-FE86BBA67565}"/>
+    <dgm:cxn modelId="{24AC7777-6A48-452C-B7AA-D17274B7F8EB}" type="presOf" srcId="{CC34B6BB-23B2-49FD-A406-648B3086DF41}" destId="{523B1C70-F75A-4619-9182-0CA1139F6CA0}" srcOrd="0" destOrd="0" presId="urn:microsoft.com/office/officeart/2005/8/layout/radial1"/>
+    <dgm:cxn modelId="{712F59E6-9F77-49BE-896E-6AB661489231}" srcId="{A50B2181-E5A6-44A1-8756-379E11E86230}" destId="{E285215F-F7D3-426D-869F-A205F1C4BF2E}" srcOrd="0" destOrd="0" parTransId="{C88ED351-B087-4B5B-B036-8A79F85B9430}" sibTransId="{8F134DCA-F37E-4B6B-8D99-CDA93A04CBF7}"/>
+    <dgm:cxn modelId="{F4F38749-FD85-4867-9022-FCD6131FC5C9}" type="presOf" srcId="{8AA4E754-3065-44F5-9AA8-EF9AEDF6D0CC}" destId="{93D91C59-4B1B-4428-99CC-CD38ED6D35DF}" srcOrd="1" destOrd="0" presId="urn:microsoft.com/office/officeart/2005/8/layout/radial1"/>
+    <dgm:cxn modelId="{55AF4365-46C2-4A68-B77B-BFAE3D99A20C}" type="presOf" srcId="{E285215F-F7D3-426D-869F-A205F1C4BF2E}" destId="{72F65768-CD9D-4B58-9D5F-6AF83E4586D6}" srcOrd="0" destOrd="0" presId="urn:microsoft.com/office/officeart/2005/8/layout/radial1"/>
+    <dgm:cxn modelId="{11858779-D06B-4BA4-B52E-C96B8437B1B6}" type="presOf" srcId="{E8090202-8229-492D-BC32-089543CCF403}" destId="{5CFD2702-8B4E-448D-9A07-BA386B2BDABF}" srcOrd="0" destOrd="0" presId="urn:microsoft.com/office/officeart/2005/8/layout/radial1"/>
+    <dgm:cxn modelId="{2C7AB0CE-C562-4F57-BE01-54AC6FF13837}" type="presOf" srcId="{2D019032-8DF9-427F-9EED-A44F575B2797}" destId="{413CE0EE-DEA9-4DCD-BDC4-1C706C61D460}" srcOrd="0" destOrd="0" presId="urn:microsoft.com/office/officeart/2005/8/layout/radial1"/>
+    <dgm:cxn modelId="{E7172AC7-3685-4A76-B8D9-73307D393D38}" type="presOf" srcId="{CC34B6BB-23B2-49FD-A406-648B3086DF41}" destId="{6C30350E-651F-4A6F-AC14-83A298240A49}" srcOrd="1" destOrd="0" presId="urn:microsoft.com/office/officeart/2005/8/layout/radial1"/>
+    <dgm:cxn modelId="{03F4B17E-2D55-43A0-9BF1-80251250F7BC}" srcId="{E285215F-F7D3-426D-869F-A205F1C4BF2E}" destId="{01ABCA04-BD82-4076-B9BE-56A01E6D25B7}" srcOrd="3" destOrd="0" parTransId="{CC34B6BB-23B2-49FD-A406-648B3086DF41}" sibTransId="{D16D7ECD-6375-4618-9E03-47DC25F83BF1}"/>
+    <dgm:cxn modelId="{64AAB6DC-AED8-4B7B-B4FC-427086EA9A8F}" type="presOf" srcId="{01ABCA04-BD82-4076-B9BE-56A01E6D25B7}" destId="{8DF26142-863A-4361-A75A-660F7E95FF6B}" srcOrd="0" destOrd="0" presId="urn:microsoft.com/office/officeart/2005/8/layout/radial1"/>
+    <dgm:cxn modelId="{26C96D0E-B60E-492D-B5C7-D2E138BFBB59}" type="presOf" srcId="{A50B2181-E5A6-44A1-8756-379E11E86230}" destId="{1C206003-3862-42FC-8D0D-5CB969C4D4D5}" srcOrd="0" destOrd="0" presId="urn:microsoft.com/office/officeart/2005/8/layout/radial1"/>
+    <dgm:cxn modelId="{0823DF6B-4D18-49B8-B035-B9CC9AB86052}" type="presOf" srcId="{B69C2618-690B-42BD-8094-89775B7AB89D}" destId="{3ED18D1C-2396-4751-93D8-F6C161B378DD}" srcOrd="0" destOrd="0" presId="urn:microsoft.com/office/officeart/2005/8/layout/radial1"/>
+    <dgm:cxn modelId="{784B2428-8BED-480B-82EB-78A5DA5FBF09}" type="presOf" srcId="{42D28648-708A-480E-87B5-ED6BB14FCE43}" destId="{B1CC1C9D-109B-4BE0-BB0C-6AFEF4A7F041}" srcOrd="1" destOrd="0" presId="urn:microsoft.com/office/officeart/2005/8/layout/radial1"/>
     <dgm:cxn modelId="{A63ACAD1-AF14-454B-8F2D-1BB2DA64D7F5}" srcId="{E285215F-F7D3-426D-869F-A205F1C4BF2E}" destId="{B69C2618-690B-42BD-8094-89775B7AB89D}" srcOrd="2" destOrd="0" parTransId="{42D28648-708A-480E-87B5-ED6BB14FCE43}" sibTransId="{D590987A-3E82-41C4-96C2-43795618FC36}"/>
-    <dgm:cxn modelId="{1EC265EC-6DEF-4609-A98A-B9CCB15258B3}" type="presOf" srcId="{D68FB0A1-64AF-4719-89C0-1735534AEBB3}" destId="{689B2ECA-B910-4525-96D0-2E5738D025FB}" srcOrd="0" destOrd="0" presId="urn:microsoft.com/office/officeart/2005/8/layout/radial1"/>
-    <dgm:cxn modelId="{2C7AB0CE-C562-4F57-BE01-54AC6FF13837}" type="presOf" srcId="{2D019032-8DF9-427F-9EED-A44F575B2797}" destId="{413CE0EE-DEA9-4DCD-BDC4-1C706C61D460}" srcOrd="0" destOrd="0" presId="urn:microsoft.com/office/officeart/2005/8/layout/radial1"/>
-    <dgm:cxn modelId="{26C96D0E-B60E-492D-B5C7-D2E138BFBB59}" type="presOf" srcId="{A50B2181-E5A6-44A1-8756-379E11E86230}" destId="{1C206003-3862-42FC-8D0D-5CB969C4D4D5}" srcOrd="0" destOrd="0" presId="urn:microsoft.com/office/officeart/2005/8/layout/radial1"/>
-    <dgm:cxn modelId="{23D40415-107F-48A9-A42D-6F72DA38CB6D}" type="presOf" srcId="{13BDC813-0B90-48F6-A0DA-2BF83E4323AC}" destId="{4478A666-3F40-47DC-9706-1A123FB90CD7}" srcOrd="0" destOrd="0" presId="urn:microsoft.com/office/officeart/2005/8/layout/radial1"/>
-    <dgm:cxn modelId="{CB7DF784-AF03-4345-92B8-EA0334A5B7FE}" type="presOf" srcId="{97BDDB0E-7BB4-40F0-B54F-BD037FA1B902}" destId="{2EC2BD0D-C97D-41AD-AE96-03BDFEBCF029}" srcOrd="1" destOrd="0" presId="urn:microsoft.com/office/officeart/2005/8/layout/radial1"/>
-    <dgm:cxn modelId="{DDC635BF-E9FF-4F6A-BAEB-227541F64C87}" type="presOf" srcId="{8AA4E754-3065-44F5-9AA8-EF9AEDF6D0CC}" destId="{54647140-69E4-41A6-A8C6-AB935EBE7A65}" srcOrd="0" destOrd="0" presId="urn:microsoft.com/office/officeart/2005/8/layout/radial1"/>
-    <dgm:cxn modelId="{E7172AC7-3685-4A76-B8D9-73307D393D38}" type="presOf" srcId="{CC34B6BB-23B2-49FD-A406-648B3086DF41}" destId="{6C30350E-651F-4A6F-AC14-83A298240A49}" srcOrd="1" destOrd="0" presId="urn:microsoft.com/office/officeart/2005/8/layout/radial1"/>
-    <dgm:cxn modelId="{D9DDA6FC-B3AF-42F0-885F-BC9324E7B391}" srcId="{E285215F-F7D3-426D-869F-A205F1C4BF2E}" destId="{2D019032-8DF9-427F-9EED-A44F575B2797}" srcOrd="0" destOrd="0" parTransId="{8AA4E754-3065-44F5-9AA8-EF9AEDF6D0CC}" sibTransId="{30EE830B-DF74-41F0-84DB-53F31DAABAD3}"/>
-    <dgm:cxn modelId="{64AAB6DC-AED8-4B7B-B4FC-427086EA9A8F}" type="presOf" srcId="{01ABCA04-BD82-4076-B9BE-56A01E6D25B7}" destId="{8DF26142-863A-4361-A75A-660F7E95FF6B}" srcOrd="0" destOrd="0" presId="urn:microsoft.com/office/officeart/2005/8/layout/radial1"/>
-    <dgm:cxn modelId="{0823DF6B-4D18-49B8-B035-B9CC9AB86052}" type="presOf" srcId="{B69C2618-690B-42BD-8094-89775B7AB89D}" destId="{3ED18D1C-2396-4751-93D8-F6C161B378DD}" srcOrd="0" destOrd="0" presId="urn:microsoft.com/office/officeart/2005/8/layout/radial1"/>
-    <dgm:cxn modelId="{F4F38749-FD85-4867-9022-FCD6131FC5C9}" type="presOf" srcId="{8AA4E754-3065-44F5-9AA8-EF9AEDF6D0CC}" destId="{93D91C59-4B1B-4428-99CC-CD38ED6D35DF}" srcOrd="1" destOrd="0" presId="urn:microsoft.com/office/officeart/2005/8/layout/radial1"/>
-    <dgm:cxn modelId="{784B2428-8BED-480B-82EB-78A5DA5FBF09}" type="presOf" srcId="{42D28648-708A-480E-87B5-ED6BB14FCE43}" destId="{B1CC1C9D-109B-4BE0-BB0C-6AFEF4A7F041}" srcOrd="1" destOrd="0" presId="urn:microsoft.com/office/officeart/2005/8/layout/radial1"/>
-    <dgm:cxn modelId="{5D2E581C-9A3C-4C7B-8DB9-0B388BCA1B6F}" srcId="{E285215F-F7D3-426D-869F-A205F1C4BF2E}" destId="{D68FB0A1-64AF-4719-89C0-1735534AEBB3}" srcOrd="4" destOrd="0" parTransId="{97BDDB0E-7BB4-40F0-B54F-BD037FA1B902}" sibTransId="{CA0EB4F4-2857-4F3B-B099-390373A5912F}"/>
-    <dgm:cxn modelId="{565C1A81-D57D-4582-97F9-EBA3B9C066AA}" type="presOf" srcId="{42D28648-708A-480E-87B5-ED6BB14FCE43}" destId="{004EB149-5DCA-4BB3-966A-0CD4E4B3D794}" srcOrd="0" destOrd="0" presId="urn:microsoft.com/office/officeart/2005/8/layout/radial1"/>
-    <dgm:cxn modelId="{24AC7777-6A48-452C-B7AA-D17274B7F8EB}" type="presOf" srcId="{CC34B6BB-23B2-49FD-A406-648B3086DF41}" destId="{523B1C70-F75A-4619-9182-0CA1139F6CA0}" srcOrd="0" destOrd="0" presId="urn:microsoft.com/office/officeart/2005/8/layout/radial1"/>
-    <dgm:cxn modelId="{17C1CA81-EFCF-4500-99A2-70B48D403800}" type="presOf" srcId="{E8090202-8229-492D-BC32-089543CCF403}" destId="{0A0683A7-FFDC-4669-BD40-6CB23803F38E}" srcOrd="1" destOrd="0" presId="urn:microsoft.com/office/officeart/2005/8/layout/radial1"/>
-    <dgm:cxn modelId="{712F59E6-9F77-49BE-896E-6AB661489231}" srcId="{A50B2181-E5A6-44A1-8756-379E11E86230}" destId="{E285215F-F7D3-426D-869F-A205F1C4BF2E}" srcOrd="0" destOrd="0" parTransId="{C88ED351-B087-4B5B-B036-8A79F85B9430}" sibTransId="{8F134DCA-F37E-4B6B-8D99-CDA93A04CBF7}"/>
-    <dgm:cxn modelId="{11858779-D06B-4BA4-B52E-C96B8437B1B6}" type="presOf" srcId="{E8090202-8229-492D-BC32-089543CCF403}" destId="{5CFD2702-8B4E-448D-9A07-BA386B2BDABF}" srcOrd="0" destOrd="0" presId="urn:microsoft.com/office/officeart/2005/8/layout/radial1"/>
-    <dgm:cxn modelId="{55AF4365-46C2-4A68-B77B-BFAE3D99A20C}" type="presOf" srcId="{E285215F-F7D3-426D-869F-A205F1C4BF2E}" destId="{72F65768-CD9D-4B58-9D5F-6AF83E4586D6}" srcOrd="0" destOrd="0" presId="urn:microsoft.com/office/officeart/2005/8/layout/radial1"/>
-    <dgm:cxn modelId="{4E45A5E4-3491-4C53-85D5-EB0A6F589374}" srcId="{E285215F-F7D3-426D-869F-A205F1C4BF2E}" destId="{13BDC813-0B90-48F6-A0DA-2BF83E4323AC}" srcOrd="1" destOrd="0" parTransId="{E8090202-8229-492D-BC32-089543CCF403}" sibTransId="{430D8C41-AA6A-488F-A2C6-FE86BBA67565}"/>
-    <dgm:cxn modelId="{477001B9-F0FC-4A08-B9D6-C0281089D8F3}" type="presOf" srcId="{97BDDB0E-7BB4-40F0-B54F-BD037FA1B902}" destId="{B3663269-5A54-41DC-AC8E-9D1288DD3DD7}" srcOrd="0" destOrd="0" presId="urn:microsoft.com/office/officeart/2005/8/layout/radial1"/>
-    <dgm:cxn modelId="{03F4B17E-2D55-43A0-9BF1-80251250F7BC}" srcId="{E285215F-F7D3-426D-869F-A205F1C4BF2E}" destId="{01ABCA04-BD82-4076-B9BE-56A01E6D25B7}" srcOrd="3" destOrd="0" parTransId="{CC34B6BB-23B2-49FD-A406-648B3086DF41}" sibTransId="{D16D7ECD-6375-4618-9E03-47DC25F83BF1}"/>
     <dgm:cxn modelId="{775D81D1-9D42-4D21-B024-BFC79916B2D5}" type="presParOf" srcId="{1C206003-3862-42FC-8D0D-5CB969C4D4D5}" destId="{72F65768-CD9D-4B58-9D5F-6AF83E4586D6}" srcOrd="0" destOrd="0" presId="urn:microsoft.com/office/officeart/2005/8/layout/radial1"/>
     <dgm:cxn modelId="{A295FC39-0FCE-4B55-8C3E-9DED14FFE44D}" type="presParOf" srcId="{1C206003-3862-42FC-8D0D-5CB969C4D4D5}" destId="{54647140-69E4-41A6-A8C6-AB935EBE7A65}" srcOrd="1" destOrd="0" presId="urn:microsoft.com/office/officeart/2005/8/layout/radial1"/>
     <dgm:cxn modelId="{8FCAFA63-97DE-4E21-B4CA-307007B2B200}" type="presParOf" srcId="{54647140-69E4-41A6-A8C6-AB935EBE7A65}" destId="{93D91C59-4B1B-4428-99CC-CD38ED6D35DF}" srcOrd="0" destOrd="0" presId="urn:microsoft.com/office/officeart/2005/8/layout/radial1"/>
@@ -7720,8 +7720,8 @@
     </dgm:pt>
   </dgm:ptLst>
   <dgm:cxnLst>
+    <dgm:cxn modelId="{EA7AB574-AB03-4584-BBF4-139271D91427}" type="presOf" srcId="{A50B2181-E5A6-44A1-8756-379E11E86230}" destId="{1C206003-3862-42FC-8D0D-5CB969C4D4D5}" srcOrd="0" destOrd="0" presId="urn:microsoft.com/office/officeart/2005/8/layout/radial1"/>
     <dgm:cxn modelId="{870A7219-1E81-48C1-A710-088E90AC005F}" type="presOf" srcId="{E8090202-8229-492D-BC32-089543CCF403}" destId="{0A0683A7-FFDC-4669-BD40-6CB23803F38E}" srcOrd="1" destOrd="0" presId="urn:microsoft.com/office/officeart/2005/8/layout/radial1"/>
-    <dgm:cxn modelId="{EA7AB574-AB03-4584-BBF4-139271D91427}" type="presOf" srcId="{A50B2181-E5A6-44A1-8756-379E11E86230}" destId="{1C206003-3862-42FC-8D0D-5CB969C4D4D5}" srcOrd="0" destOrd="0" presId="urn:microsoft.com/office/officeart/2005/8/layout/radial1"/>
     <dgm:cxn modelId="{6EA05241-587D-4D5B-AD7C-191C913AEA2E}" type="presOf" srcId="{97BDDB0E-7BB4-40F0-B54F-BD037FA1B902}" destId="{B3663269-5A54-41DC-AC8E-9D1288DD3DD7}" srcOrd="0" destOrd="0" presId="urn:microsoft.com/office/officeart/2005/8/layout/radial1"/>
     <dgm:cxn modelId="{C2084B57-699D-4771-B105-2D849AE830CA}" type="presOf" srcId="{13BDC813-0B90-48F6-A0DA-2BF83E4323AC}" destId="{4478A666-3F40-47DC-9706-1A123FB90CD7}" srcOrd="0" destOrd="0" presId="urn:microsoft.com/office/officeart/2005/8/layout/radial1"/>
     <dgm:cxn modelId="{74358708-FEF4-49F1-A335-1CA00AEB0F44}" type="presOf" srcId="{B69C2618-690B-42BD-8094-89775B7AB89D}" destId="{3ED18D1C-2396-4751-93D8-F6C161B378DD}" srcOrd="0" destOrd="0" presId="urn:microsoft.com/office/officeart/2005/8/layout/radial1"/>
@@ -7737,8 +7737,8 @@
     <dgm:cxn modelId="{349DD195-2166-4698-B666-58243DE41E07}" type="presOf" srcId="{CC34B6BB-23B2-49FD-A406-648B3086DF41}" destId="{6C30350E-651F-4A6F-AC14-83A298240A49}" srcOrd="1" destOrd="0" presId="urn:microsoft.com/office/officeart/2005/8/layout/radial1"/>
     <dgm:cxn modelId="{9EFA661B-1068-4749-AFA2-65C92907EE3F}" type="presOf" srcId="{E285215F-F7D3-426D-869F-A205F1C4BF2E}" destId="{72F65768-CD9D-4B58-9D5F-6AF83E4586D6}" srcOrd="0" destOrd="0" presId="urn:microsoft.com/office/officeart/2005/8/layout/radial1"/>
     <dgm:cxn modelId="{03F4B17E-2D55-43A0-9BF1-80251250F7BC}" srcId="{E285215F-F7D3-426D-869F-A205F1C4BF2E}" destId="{01ABCA04-BD82-4076-B9BE-56A01E6D25B7}" srcOrd="3" destOrd="0" parTransId="{CC34B6BB-23B2-49FD-A406-648B3086DF41}" sibTransId="{D16D7ECD-6375-4618-9E03-47DC25F83BF1}"/>
+    <dgm:cxn modelId="{823EE7D8-FDA4-47AD-B4E4-0DA277051A86}" type="presOf" srcId="{97BDDB0E-7BB4-40F0-B54F-BD037FA1B902}" destId="{2EC2BD0D-C97D-41AD-AE96-03BDFEBCF029}" srcOrd="1" destOrd="0" presId="urn:microsoft.com/office/officeart/2005/8/layout/radial1"/>
     <dgm:cxn modelId="{43BDEEA4-4798-418C-96DA-DD03AD11412D}" type="presOf" srcId="{CC34B6BB-23B2-49FD-A406-648B3086DF41}" destId="{523B1C70-F75A-4619-9182-0CA1139F6CA0}" srcOrd="0" destOrd="0" presId="urn:microsoft.com/office/officeart/2005/8/layout/radial1"/>
-    <dgm:cxn modelId="{823EE7D8-FDA4-47AD-B4E4-0DA277051A86}" type="presOf" srcId="{97BDDB0E-7BB4-40F0-B54F-BD037FA1B902}" destId="{2EC2BD0D-C97D-41AD-AE96-03BDFEBCF029}" srcOrd="1" destOrd="0" presId="urn:microsoft.com/office/officeart/2005/8/layout/radial1"/>
     <dgm:cxn modelId="{A73742D3-01CF-475A-8BA3-3CDD021C0316}" type="presOf" srcId="{01ABCA04-BD82-4076-B9BE-56A01E6D25B7}" destId="{8DF26142-863A-4361-A75A-660F7E95FF6B}" srcOrd="0" destOrd="0" presId="urn:microsoft.com/office/officeart/2005/8/layout/radial1"/>
     <dgm:cxn modelId="{D98AE530-DAAC-423C-98A5-030DC87B236F}" type="presOf" srcId="{42D28648-708A-480E-87B5-ED6BB14FCE43}" destId="{004EB149-5DCA-4BB3-966A-0CD4E4B3D794}" srcOrd="0" destOrd="0" presId="urn:microsoft.com/office/officeart/2005/8/layout/radial1"/>
     <dgm:cxn modelId="{862C6CA4-3C02-4AB3-A4EA-B1BAC5880095}" type="presOf" srcId="{8AA4E754-3065-44F5-9AA8-EF9AEDF6D0CC}" destId="{54647140-69E4-41A6-A8C6-AB935EBE7A65}" srcOrd="0" destOrd="0" presId="urn:microsoft.com/office/officeart/2005/8/layout/radial1"/>
@@ -8348,29 +8348,29 @@
     </dgm:pt>
   </dgm:ptLst>
   <dgm:cxnLst>
+    <dgm:cxn modelId="{4E45A5E4-3491-4C53-85D5-EB0A6F589374}" srcId="{E285215F-F7D3-426D-869F-A205F1C4BF2E}" destId="{13BDC813-0B90-48F6-A0DA-2BF83E4323AC}" srcOrd="1" destOrd="0" parTransId="{E8090202-8229-492D-BC32-089543CCF403}" sibTransId="{430D8C41-AA6A-488F-A2C6-FE86BBA67565}"/>
+    <dgm:cxn modelId="{712F59E6-9F77-49BE-896E-6AB661489231}" srcId="{A50B2181-E5A6-44A1-8756-379E11E86230}" destId="{E285215F-F7D3-426D-869F-A205F1C4BF2E}" srcOrd="0" destOrd="0" parTransId="{C88ED351-B087-4B5B-B036-8A79F85B9430}" sibTransId="{8F134DCA-F37E-4B6B-8D99-CDA93A04CBF7}"/>
+    <dgm:cxn modelId="{3527B224-AC74-4430-944A-C5008D4915D9}" type="presOf" srcId="{CC34B6BB-23B2-49FD-A406-648B3086DF41}" destId="{6C30350E-651F-4A6F-AC14-83A298240A49}" srcOrd="1" destOrd="0" presId="urn:microsoft.com/office/officeart/2005/8/layout/radial1"/>
+    <dgm:cxn modelId="{E5C77C31-FE5A-4F18-A33D-3AE60C2FC619}" type="presOf" srcId="{8AA4E754-3065-44F5-9AA8-EF9AEDF6D0CC}" destId="{93D91C59-4B1B-4428-99CC-CD38ED6D35DF}" srcOrd="1" destOrd="0" presId="urn:microsoft.com/office/officeart/2005/8/layout/radial1"/>
+    <dgm:cxn modelId="{5D2E581C-9A3C-4C7B-8DB9-0B388BCA1B6F}" srcId="{E285215F-F7D3-426D-869F-A205F1C4BF2E}" destId="{D68FB0A1-64AF-4719-89C0-1735534AEBB3}" srcOrd="4" destOrd="0" parTransId="{97BDDB0E-7BB4-40F0-B54F-BD037FA1B902}" sibTransId="{CA0EB4F4-2857-4F3B-B099-390373A5912F}"/>
+    <dgm:cxn modelId="{23959E88-8644-431A-A48D-4539A598A5A9}" type="presOf" srcId="{A50B2181-E5A6-44A1-8756-379E11E86230}" destId="{1C206003-3862-42FC-8D0D-5CB969C4D4D5}" srcOrd="0" destOrd="0" presId="urn:microsoft.com/office/officeart/2005/8/layout/radial1"/>
+    <dgm:cxn modelId="{0BE85D9A-662C-4DCE-8055-21FF26EAE6E0}" type="presOf" srcId="{42D28648-708A-480E-87B5-ED6BB14FCE43}" destId="{B1CC1C9D-109B-4BE0-BB0C-6AFEF4A7F041}" srcOrd="1" destOrd="0" presId="urn:microsoft.com/office/officeart/2005/8/layout/radial1"/>
+    <dgm:cxn modelId="{D9DDA6FC-B3AF-42F0-885F-BC9324E7B391}" srcId="{E285215F-F7D3-426D-869F-A205F1C4BF2E}" destId="{2D019032-8DF9-427F-9EED-A44F575B2797}" srcOrd="0" destOrd="0" parTransId="{8AA4E754-3065-44F5-9AA8-EF9AEDF6D0CC}" sibTransId="{30EE830B-DF74-41F0-84DB-53F31DAABAD3}"/>
+    <dgm:cxn modelId="{C45F8FDC-2EB9-4C77-A5E0-1CE07C67975E}" type="presOf" srcId="{8AA4E754-3065-44F5-9AA8-EF9AEDF6D0CC}" destId="{54647140-69E4-41A6-A8C6-AB935EBE7A65}" srcOrd="0" destOrd="0" presId="urn:microsoft.com/office/officeart/2005/8/layout/radial1"/>
+    <dgm:cxn modelId="{41E89556-59DA-423A-BF66-87F8BA91D83F}" type="presOf" srcId="{E8090202-8229-492D-BC32-089543CCF403}" destId="{0A0683A7-FFDC-4669-BD40-6CB23803F38E}" srcOrd="1" destOrd="0" presId="urn:microsoft.com/office/officeart/2005/8/layout/radial1"/>
+    <dgm:cxn modelId="{394F02FC-FD11-422C-9533-EF371EDE61A5}" type="presOf" srcId="{13BDC813-0B90-48F6-A0DA-2BF83E4323AC}" destId="{4478A666-3F40-47DC-9706-1A123FB90CD7}" srcOrd="0" destOrd="0" presId="urn:microsoft.com/office/officeart/2005/8/layout/radial1"/>
+    <dgm:cxn modelId="{7EB9EFF4-F402-451B-A1E2-94E6FEBCB9C0}" type="presOf" srcId="{E285215F-F7D3-426D-869F-A205F1C4BF2E}" destId="{72F65768-CD9D-4B58-9D5F-6AF83E4586D6}" srcOrd="0" destOrd="0" presId="urn:microsoft.com/office/officeart/2005/8/layout/radial1"/>
+    <dgm:cxn modelId="{03F4B17E-2D55-43A0-9BF1-80251250F7BC}" srcId="{E285215F-F7D3-426D-869F-A205F1C4BF2E}" destId="{01ABCA04-BD82-4076-B9BE-56A01E6D25B7}" srcOrd="3" destOrd="0" parTransId="{CC34B6BB-23B2-49FD-A406-648B3086DF41}" sibTransId="{D16D7ECD-6375-4618-9E03-47DC25F83BF1}"/>
+    <dgm:cxn modelId="{AF6EABEE-2F15-4013-88EC-3C14B56E3842}" type="presOf" srcId="{97BDDB0E-7BB4-40F0-B54F-BD037FA1B902}" destId="{B3663269-5A54-41DC-AC8E-9D1288DD3DD7}" srcOrd="0" destOrd="0" presId="urn:microsoft.com/office/officeart/2005/8/layout/radial1"/>
     <dgm:cxn modelId="{DA4F5DA4-0D30-443C-94C7-C8D63CECFADC}" type="presOf" srcId="{B69C2618-690B-42BD-8094-89775B7AB89D}" destId="{3ED18D1C-2396-4751-93D8-F6C161B378DD}" srcOrd="0" destOrd="0" presId="urn:microsoft.com/office/officeart/2005/8/layout/radial1"/>
     <dgm:cxn modelId="{BA322031-CCBA-406A-AE23-60967461D52F}" type="presOf" srcId="{D68FB0A1-64AF-4719-89C0-1735534AEBB3}" destId="{689B2ECA-B910-4525-96D0-2E5738D025FB}" srcOrd="0" destOrd="0" presId="urn:microsoft.com/office/officeart/2005/8/layout/radial1"/>
+    <dgm:cxn modelId="{A63ACAD1-AF14-454B-8F2D-1BB2DA64D7F5}" srcId="{E285215F-F7D3-426D-869F-A205F1C4BF2E}" destId="{B69C2618-690B-42BD-8094-89775B7AB89D}" srcOrd="2" destOrd="0" parTransId="{42D28648-708A-480E-87B5-ED6BB14FCE43}" sibTransId="{D590987A-3E82-41C4-96C2-43795618FC36}"/>
     <dgm:cxn modelId="{BB7E339A-D297-4061-A8B2-702C83CF7013}" type="presOf" srcId="{01ABCA04-BD82-4076-B9BE-56A01E6D25B7}" destId="{8DF26142-863A-4361-A75A-660F7E95FF6B}" srcOrd="0" destOrd="0" presId="urn:microsoft.com/office/officeart/2005/8/layout/radial1"/>
-    <dgm:cxn modelId="{7A398E4E-7533-420B-8A13-DC2A305B43E6}" type="presOf" srcId="{97BDDB0E-7BB4-40F0-B54F-BD037FA1B902}" destId="{2EC2BD0D-C97D-41AD-AE96-03BDFEBCF029}" srcOrd="1" destOrd="0" presId="urn:microsoft.com/office/officeart/2005/8/layout/radial1"/>
-    <dgm:cxn modelId="{3527B224-AC74-4430-944A-C5008D4915D9}" type="presOf" srcId="{CC34B6BB-23B2-49FD-A406-648B3086DF41}" destId="{6C30350E-651F-4A6F-AC14-83A298240A49}" srcOrd="1" destOrd="0" presId="urn:microsoft.com/office/officeart/2005/8/layout/radial1"/>
-    <dgm:cxn modelId="{E5C77C31-FE5A-4F18-A33D-3AE60C2FC619}" type="presOf" srcId="{8AA4E754-3065-44F5-9AA8-EF9AEDF6D0CC}" destId="{93D91C59-4B1B-4428-99CC-CD38ED6D35DF}" srcOrd="1" destOrd="0" presId="urn:microsoft.com/office/officeart/2005/8/layout/radial1"/>
-    <dgm:cxn modelId="{0BE85D9A-662C-4DCE-8055-21FF26EAE6E0}" type="presOf" srcId="{42D28648-708A-480E-87B5-ED6BB14FCE43}" destId="{B1CC1C9D-109B-4BE0-BB0C-6AFEF4A7F041}" srcOrd="1" destOrd="0" presId="urn:microsoft.com/office/officeart/2005/8/layout/radial1"/>
-    <dgm:cxn modelId="{A63ACAD1-AF14-454B-8F2D-1BB2DA64D7F5}" srcId="{E285215F-F7D3-426D-869F-A205F1C4BF2E}" destId="{B69C2618-690B-42BD-8094-89775B7AB89D}" srcOrd="2" destOrd="0" parTransId="{42D28648-708A-480E-87B5-ED6BB14FCE43}" sibTransId="{D590987A-3E82-41C4-96C2-43795618FC36}"/>
-    <dgm:cxn modelId="{41E89556-59DA-423A-BF66-87F8BA91D83F}" type="presOf" srcId="{E8090202-8229-492D-BC32-089543CCF403}" destId="{0A0683A7-FFDC-4669-BD40-6CB23803F38E}" srcOrd="1" destOrd="0" presId="urn:microsoft.com/office/officeart/2005/8/layout/radial1"/>
     <dgm:cxn modelId="{14F7262D-55A8-4CAE-ACBB-BEC767A7F5B4}" type="presOf" srcId="{CC34B6BB-23B2-49FD-A406-648B3086DF41}" destId="{523B1C70-F75A-4619-9182-0CA1139F6CA0}" srcOrd="0" destOrd="0" presId="urn:microsoft.com/office/officeart/2005/8/layout/radial1"/>
-    <dgm:cxn modelId="{712F59E6-9F77-49BE-896E-6AB661489231}" srcId="{A50B2181-E5A6-44A1-8756-379E11E86230}" destId="{E285215F-F7D3-426D-869F-A205F1C4BF2E}" srcOrd="0" destOrd="0" parTransId="{C88ED351-B087-4B5B-B036-8A79F85B9430}" sibTransId="{8F134DCA-F37E-4B6B-8D99-CDA93A04CBF7}"/>
-    <dgm:cxn modelId="{23959E88-8644-431A-A48D-4539A598A5A9}" type="presOf" srcId="{A50B2181-E5A6-44A1-8756-379E11E86230}" destId="{1C206003-3862-42FC-8D0D-5CB969C4D4D5}" srcOrd="0" destOrd="0" presId="urn:microsoft.com/office/officeart/2005/8/layout/radial1"/>
-    <dgm:cxn modelId="{AF6EABEE-2F15-4013-88EC-3C14B56E3842}" type="presOf" srcId="{97BDDB0E-7BB4-40F0-B54F-BD037FA1B902}" destId="{B3663269-5A54-41DC-AC8E-9D1288DD3DD7}" srcOrd="0" destOrd="0" presId="urn:microsoft.com/office/officeart/2005/8/layout/radial1"/>
-    <dgm:cxn modelId="{5D2E581C-9A3C-4C7B-8DB9-0B388BCA1B6F}" srcId="{E285215F-F7D3-426D-869F-A205F1C4BF2E}" destId="{D68FB0A1-64AF-4719-89C0-1735534AEBB3}" srcOrd="4" destOrd="0" parTransId="{97BDDB0E-7BB4-40F0-B54F-BD037FA1B902}" sibTransId="{CA0EB4F4-2857-4F3B-B099-390373A5912F}"/>
-    <dgm:cxn modelId="{394F02FC-FD11-422C-9533-EF371EDE61A5}" type="presOf" srcId="{13BDC813-0B90-48F6-A0DA-2BF83E4323AC}" destId="{4478A666-3F40-47DC-9706-1A123FB90CD7}" srcOrd="0" destOrd="0" presId="urn:microsoft.com/office/officeart/2005/8/layout/radial1"/>
-    <dgm:cxn modelId="{D9DDA6FC-B3AF-42F0-885F-BC9324E7B391}" srcId="{E285215F-F7D3-426D-869F-A205F1C4BF2E}" destId="{2D019032-8DF9-427F-9EED-A44F575B2797}" srcOrd="0" destOrd="0" parTransId="{8AA4E754-3065-44F5-9AA8-EF9AEDF6D0CC}" sibTransId="{30EE830B-DF74-41F0-84DB-53F31DAABAD3}"/>
+    <dgm:cxn modelId="{BFA44BB3-2871-4755-991A-46FE39F789E2}" type="presOf" srcId="{2D019032-8DF9-427F-9EED-A44F575B2797}" destId="{413CE0EE-DEA9-4DCD-BDC4-1C706C61D460}" srcOrd="0" destOrd="0" presId="urn:microsoft.com/office/officeart/2005/8/layout/radial1"/>
     <dgm:cxn modelId="{96BD6664-ECE3-456F-B456-4439A28821E8}" type="presOf" srcId="{E8090202-8229-492D-BC32-089543CCF403}" destId="{5CFD2702-8B4E-448D-9A07-BA386B2BDABF}" srcOrd="0" destOrd="0" presId="urn:microsoft.com/office/officeart/2005/8/layout/radial1"/>
     <dgm:cxn modelId="{485FD3DC-5E6C-4B6D-9E1C-27B7E3A9CAE9}" type="presOf" srcId="{42D28648-708A-480E-87B5-ED6BB14FCE43}" destId="{004EB149-5DCA-4BB3-966A-0CD4E4B3D794}" srcOrd="0" destOrd="0" presId="urn:microsoft.com/office/officeart/2005/8/layout/radial1"/>
-    <dgm:cxn modelId="{03F4B17E-2D55-43A0-9BF1-80251250F7BC}" srcId="{E285215F-F7D3-426D-869F-A205F1C4BF2E}" destId="{01ABCA04-BD82-4076-B9BE-56A01E6D25B7}" srcOrd="3" destOrd="0" parTransId="{CC34B6BB-23B2-49FD-A406-648B3086DF41}" sibTransId="{D16D7ECD-6375-4618-9E03-47DC25F83BF1}"/>
-    <dgm:cxn modelId="{4E45A5E4-3491-4C53-85D5-EB0A6F589374}" srcId="{E285215F-F7D3-426D-869F-A205F1C4BF2E}" destId="{13BDC813-0B90-48F6-A0DA-2BF83E4323AC}" srcOrd="1" destOrd="0" parTransId="{E8090202-8229-492D-BC32-089543CCF403}" sibTransId="{430D8C41-AA6A-488F-A2C6-FE86BBA67565}"/>
-    <dgm:cxn modelId="{C45F8FDC-2EB9-4C77-A5E0-1CE07C67975E}" type="presOf" srcId="{8AA4E754-3065-44F5-9AA8-EF9AEDF6D0CC}" destId="{54647140-69E4-41A6-A8C6-AB935EBE7A65}" srcOrd="0" destOrd="0" presId="urn:microsoft.com/office/officeart/2005/8/layout/radial1"/>
-    <dgm:cxn modelId="{BFA44BB3-2871-4755-991A-46FE39F789E2}" type="presOf" srcId="{2D019032-8DF9-427F-9EED-A44F575B2797}" destId="{413CE0EE-DEA9-4DCD-BDC4-1C706C61D460}" srcOrd="0" destOrd="0" presId="urn:microsoft.com/office/officeart/2005/8/layout/radial1"/>
-    <dgm:cxn modelId="{7EB9EFF4-F402-451B-A1E2-94E6FEBCB9C0}" type="presOf" srcId="{E285215F-F7D3-426D-869F-A205F1C4BF2E}" destId="{72F65768-CD9D-4B58-9D5F-6AF83E4586D6}" srcOrd="0" destOrd="0" presId="urn:microsoft.com/office/officeart/2005/8/layout/radial1"/>
+    <dgm:cxn modelId="{7A398E4E-7533-420B-8A13-DC2A305B43E6}" type="presOf" srcId="{97BDDB0E-7BB4-40F0-B54F-BD037FA1B902}" destId="{2EC2BD0D-C97D-41AD-AE96-03BDFEBCF029}" srcOrd="1" destOrd="0" presId="urn:microsoft.com/office/officeart/2005/8/layout/radial1"/>
     <dgm:cxn modelId="{488E49CD-41FD-40BA-B38B-C79F56F7B74E}" type="presParOf" srcId="{1C206003-3862-42FC-8D0D-5CB969C4D4D5}" destId="{72F65768-CD9D-4B58-9D5F-6AF83E4586D6}" srcOrd="0" destOrd="0" presId="urn:microsoft.com/office/officeart/2005/8/layout/radial1"/>
     <dgm:cxn modelId="{6E060625-112C-4EEE-8C12-594B3908E068}" type="presParOf" srcId="{1C206003-3862-42FC-8D0D-5CB969C4D4D5}" destId="{54647140-69E4-41A6-A8C6-AB935EBE7A65}" srcOrd="1" destOrd="0" presId="urn:microsoft.com/office/officeart/2005/8/layout/radial1"/>
     <dgm:cxn modelId="{DB17B6FC-E44A-4501-9AB8-212264267314}" type="presParOf" srcId="{54647140-69E4-41A6-A8C6-AB935EBE7A65}" destId="{93D91C59-4B1B-4428-99CC-CD38ED6D35DF}" srcOrd="0" destOrd="0" presId="urn:microsoft.com/office/officeart/2005/8/layout/radial1"/>
@@ -8982,8 +8982,8 @@
     <dgm:cxn modelId="{7FC8FA28-4BE3-41DB-B795-84A2582D39B8}" type="presOf" srcId="{42D28648-708A-480E-87B5-ED6BB14FCE43}" destId="{B1CC1C9D-109B-4BE0-BB0C-6AFEF4A7F041}" srcOrd="1" destOrd="0" presId="urn:microsoft.com/office/officeart/2005/8/layout/radial1"/>
     <dgm:cxn modelId="{D9DDA6FC-B3AF-42F0-885F-BC9324E7B391}" srcId="{E285215F-F7D3-426D-869F-A205F1C4BF2E}" destId="{2D019032-8DF9-427F-9EED-A44F575B2797}" srcOrd="0" destOrd="0" parTransId="{8AA4E754-3065-44F5-9AA8-EF9AEDF6D0CC}" sibTransId="{30EE830B-DF74-41F0-84DB-53F31DAABAD3}"/>
     <dgm:cxn modelId="{36DE3D9B-5346-486C-BD20-8E2824E37145}" type="presOf" srcId="{01ABCA04-BD82-4076-B9BE-56A01E6D25B7}" destId="{8DF26142-863A-4361-A75A-660F7E95FF6B}" srcOrd="0" destOrd="0" presId="urn:microsoft.com/office/officeart/2005/8/layout/radial1"/>
+    <dgm:cxn modelId="{97AF9ABE-3E82-48CD-8311-AE3EC52697F2}" type="presOf" srcId="{A50B2181-E5A6-44A1-8756-379E11E86230}" destId="{1C206003-3862-42FC-8D0D-5CB969C4D4D5}" srcOrd="0" destOrd="0" presId="urn:microsoft.com/office/officeart/2005/8/layout/radial1"/>
     <dgm:cxn modelId="{D4A7C164-70D5-458C-80C3-8A6BDC6D7BBD}" type="presOf" srcId="{97BDDB0E-7BB4-40F0-B54F-BD037FA1B902}" destId="{2EC2BD0D-C97D-41AD-AE96-03BDFEBCF029}" srcOrd="1" destOrd="0" presId="urn:microsoft.com/office/officeart/2005/8/layout/radial1"/>
-    <dgm:cxn modelId="{97AF9ABE-3E82-48CD-8311-AE3EC52697F2}" type="presOf" srcId="{A50B2181-E5A6-44A1-8756-379E11E86230}" destId="{1C206003-3862-42FC-8D0D-5CB969C4D4D5}" srcOrd="0" destOrd="0" presId="urn:microsoft.com/office/officeart/2005/8/layout/radial1"/>
     <dgm:cxn modelId="{0B8C5413-B59E-4BA2-81CB-98F1C1579CF3}" type="presOf" srcId="{8AA4E754-3065-44F5-9AA8-EF9AEDF6D0CC}" destId="{54647140-69E4-41A6-A8C6-AB935EBE7A65}" srcOrd="0" destOrd="0" presId="urn:microsoft.com/office/officeart/2005/8/layout/radial1"/>
     <dgm:cxn modelId="{5D2E581C-9A3C-4C7B-8DB9-0B388BCA1B6F}" srcId="{E285215F-F7D3-426D-869F-A205F1C4BF2E}" destId="{D68FB0A1-64AF-4719-89C0-1735534AEBB3}" srcOrd="4" destOrd="0" parTransId="{97BDDB0E-7BB4-40F0-B54F-BD037FA1B902}" sibTransId="{CA0EB4F4-2857-4F3B-B099-390373A5912F}"/>
     <dgm:cxn modelId="{4E45A5E4-3491-4C53-85D5-EB0A6F589374}" srcId="{E285215F-F7D3-426D-869F-A205F1C4BF2E}" destId="{13BDC813-0B90-48F6-A0DA-2BF83E4323AC}" srcOrd="1" destOrd="0" parTransId="{E8090202-8229-492D-BC32-089543CCF403}" sibTransId="{430D8C41-AA6A-488F-A2C6-FE86BBA67565}"/>
@@ -9604,28 +9604,28 @@
     </dgm:pt>
   </dgm:ptLst>
   <dgm:cxnLst>
-    <dgm:cxn modelId="{ECF25E4C-CEEF-4807-A6D7-63B7905F0BFA}" type="presOf" srcId="{8AA4E754-3065-44F5-9AA8-EF9AEDF6D0CC}" destId="{54647140-69E4-41A6-A8C6-AB935EBE7A65}" srcOrd="0" destOrd="0" presId="urn:microsoft.com/office/officeart/2005/8/layout/radial1"/>
-    <dgm:cxn modelId="{94DF55F8-A89A-4BC2-B081-50F3C58ED422}" type="presOf" srcId="{E8090202-8229-492D-BC32-089543CCF403}" destId="{5CFD2702-8B4E-448D-9A07-BA386B2BDABF}" srcOrd="0" destOrd="0" presId="urn:microsoft.com/office/officeart/2005/8/layout/radial1"/>
-    <dgm:cxn modelId="{3BF4C620-5748-44EE-B326-B6A235235640}" type="presOf" srcId="{E285215F-F7D3-426D-869F-A205F1C4BF2E}" destId="{72F65768-CD9D-4B58-9D5F-6AF83E4586D6}" srcOrd="0" destOrd="0" presId="urn:microsoft.com/office/officeart/2005/8/layout/radial1"/>
-    <dgm:cxn modelId="{6F9821E4-88B8-49FA-9C35-03C885E83814}" type="presOf" srcId="{CC34B6BB-23B2-49FD-A406-648B3086DF41}" destId="{523B1C70-F75A-4619-9182-0CA1139F6CA0}" srcOrd="0" destOrd="0" presId="urn:microsoft.com/office/officeart/2005/8/layout/radial1"/>
-    <dgm:cxn modelId="{4FCD55FC-4D48-4EF2-9CBE-41FF9DCA99D1}" type="presOf" srcId="{CC34B6BB-23B2-49FD-A406-648B3086DF41}" destId="{6C30350E-651F-4A6F-AC14-83A298240A49}" srcOrd="1" destOrd="0" presId="urn:microsoft.com/office/officeart/2005/8/layout/radial1"/>
-    <dgm:cxn modelId="{D9DDA6FC-B3AF-42F0-885F-BC9324E7B391}" srcId="{E285215F-F7D3-426D-869F-A205F1C4BF2E}" destId="{2D019032-8DF9-427F-9EED-A44F575B2797}" srcOrd="0" destOrd="0" parTransId="{8AA4E754-3065-44F5-9AA8-EF9AEDF6D0CC}" sibTransId="{30EE830B-DF74-41F0-84DB-53F31DAABAD3}"/>
-    <dgm:cxn modelId="{6FD336A7-E108-4185-B758-E5874418662D}" type="presOf" srcId="{E8090202-8229-492D-BC32-089543CCF403}" destId="{0A0683A7-FFDC-4669-BD40-6CB23803F38E}" srcOrd="1" destOrd="0" presId="urn:microsoft.com/office/officeart/2005/8/layout/radial1"/>
-    <dgm:cxn modelId="{30CB675E-E349-488D-879C-A2B96E8773C3}" type="presOf" srcId="{A50B2181-E5A6-44A1-8756-379E11E86230}" destId="{1C206003-3862-42FC-8D0D-5CB969C4D4D5}" srcOrd="0" destOrd="0" presId="urn:microsoft.com/office/officeart/2005/8/layout/radial1"/>
-    <dgm:cxn modelId="{AC3B1524-9D52-4402-9771-A77FE22DE7C0}" type="presOf" srcId="{42D28648-708A-480E-87B5-ED6BB14FCE43}" destId="{B1CC1C9D-109B-4BE0-BB0C-6AFEF4A7F041}" srcOrd="1" destOrd="0" presId="urn:microsoft.com/office/officeart/2005/8/layout/radial1"/>
-    <dgm:cxn modelId="{CC568747-6F82-4BBA-920B-EE1585D3BE72}" type="presOf" srcId="{42D28648-708A-480E-87B5-ED6BB14FCE43}" destId="{004EB149-5DCA-4BB3-966A-0CD4E4B3D794}" srcOrd="0" destOrd="0" presId="urn:microsoft.com/office/officeart/2005/8/layout/radial1"/>
-    <dgm:cxn modelId="{374127C1-1CD2-4240-AEE2-AF168ED1DC70}" type="presOf" srcId="{B69C2618-690B-42BD-8094-89775B7AB89D}" destId="{3ED18D1C-2396-4751-93D8-F6C161B378DD}" srcOrd="0" destOrd="0" presId="urn:microsoft.com/office/officeart/2005/8/layout/radial1"/>
-    <dgm:cxn modelId="{74818AC1-E27C-4825-80D9-0F19D3D9F7F1}" type="presOf" srcId="{97BDDB0E-7BB4-40F0-B54F-BD037FA1B902}" destId="{B3663269-5A54-41DC-AC8E-9D1288DD3DD7}" srcOrd="0" destOrd="0" presId="urn:microsoft.com/office/officeart/2005/8/layout/radial1"/>
-    <dgm:cxn modelId="{5D2E581C-9A3C-4C7B-8DB9-0B388BCA1B6F}" srcId="{E285215F-F7D3-426D-869F-A205F1C4BF2E}" destId="{D68FB0A1-64AF-4719-89C0-1735534AEBB3}" srcOrd="4" destOrd="0" parTransId="{97BDDB0E-7BB4-40F0-B54F-BD037FA1B902}" sibTransId="{CA0EB4F4-2857-4F3B-B099-390373A5912F}"/>
     <dgm:cxn modelId="{4E45A5E4-3491-4C53-85D5-EB0A6F589374}" srcId="{E285215F-F7D3-426D-869F-A205F1C4BF2E}" destId="{13BDC813-0B90-48F6-A0DA-2BF83E4323AC}" srcOrd="1" destOrd="0" parTransId="{E8090202-8229-492D-BC32-089543CCF403}" sibTransId="{430D8C41-AA6A-488F-A2C6-FE86BBA67565}"/>
     <dgm:cxn modelId="{712F59E6-9F77-49BE-896E-6AB661489231}" srcId="{A50B2181-E5A6-44A1-8756-379E11E86230}" destId="{E285215F-F7D3-426D-869F-A205F1C4BF2E}" srcOrd="0" destOrd="0" parTransId="{C88ED351-B087-4B5B-B036-8A79F85B9430}" sibTransId="{8F134DCA-F37E-4B6B-8D99-CDA93A04CBF7}"/>
+    <dgm:cxn modelId="{1E09B44D-7CCE-4DC9-81BB-069BF617DFCC}" type="presOf" srcId="{2D019032-8DF9-427F-9EED-A44F575B2797}" destId="{413CE0EE-DEA9-4DCD-BDC4-1C706C61D460}" srcOrd="0" destOrd="0" presId="urn:microsoft.com/office/officeart/2005/8/layout/radial1"/>
+    <dgm:cxn modelId="{30CB675E-E349-488D-879C-A2B96E8773C3}" type="presOf" srcId="{A50B2181-E5A6-44A1-8756-379E11E86230}" destId="{1C206003-3862-42FC-8D0D-5CB969C4D4D5}" srcOrd="0" destOrd="0" presId="urn:microsoft.com/office/officeart/2005/8/layout/radial1"/>
+    <dgm:cxn modelId="{374127C1-1CD2-4240-AEE2-AF168ED1DC70}" type="presOf" srcId="{B69C2618-690B-42BD-8094-89775B7AB89D}" destId="{3ED18D1C-2396-4751-93D8-F6C161B378DD}" srcOrd="0" destOrd="0" presId="urn:microsoft.com/office/officeart/2005/8/layout/radial1"/>
     <dgm:cxn modelId="{E00420E6-F32A-42C4-9C82-E9A7F2D358E3}" type="presOf" srcId="{8AA4E754-3065-44F5-9AA8-EF9AEDF6D0CC}" destId="{93D91C59-4B1B-4428-99CC-CD38ED6D35DF}" srcOrd="1" destOrd="0" presId="urn:microsoft.com/office/officeart/2005/8/layout/radial1"/>
+    <dgm:cxn modelId="{CC568747-6F82-4BBA-920B-EE1585D3BE72}" type="presOf" srcId="{42D28648-708A-480E-87B5-ED6BB14FCE43}" destId="{004EB149-5DCA-4BB3-966A-0CD4E4B3D794}" srcOrd="0" destOrd="0" presId="urn:microsoft.com/office/officeart/2005/8/layout/radial1"/>
+    <dgm:cxn modelId="{5D2E581C-9A3C-4C7B-8DB9-0B388BCA1B6F}" srcId="{E285215F-F7D3-426D-869F-A205F1C4BF2E}" destId="{D68FB0A1-64AF-4719-89C0-1735534AEBB3}" srcOrd="4" destOrd="0" parTransId="{97BDDB0E-7BB4-40F0-B54F-BD037FA1B902}" sibTransId="{CA0EB4F4-2857-4F3B-B099-390373A5912F}"/>
+    <dgm:cxn modelId="{08254CBE-4811-4986-8DE2-9E4B7A454787}" type="presOf" srcId="{01ABCA04-BD82-4076-B9BE-56A01E6D25B7}" destId="{8DF26142-863A-4361-A75A-660F7E95FF6B}" srcOrd="0" destOrd="0" presId="urn:microsoft.com/office/officeart/2005/8/layout/radial1"/>
+    <dgm:cxn modelId="{C0C1D6EC-C3F7-43A0-8286-A81A49676574}" type="presOf" srcId="{13BDC813-0B90-48F6-A0DA-2BF83E4323AC}" destId="{4478A666-3F40-47DC-9706-1A123FB90CD7}" srcOrd="0" destOrd="0" presId="urn:microsoft.com/office/officeart/2005/8/layout/radial1"/>
+    <dgm:cxn modelId="{94DF55F8-A89A-4BC2-B081-50F3C58ED422}" type="presOf" srcId="{E8090202-8229-492D-BC32-089543CCF403}" destId="{5CFD2702-8B4E-448D-9A07-BA386B2BDABF}" srcOrd="0" destOrd="0" presId="urn:microsoft.com/office/officeart/2005/8/layout/radial1"/>
+    <dgm:cxn modelId="{4FCD55FC-4D48-4EF2-9CBE-41FF9DCA99D1}" type="presOf" srcId="{CC34B6BB-23B2-49FD-A406-648B3086DF41}" destId="{6C30350E-651F-4A6F-AC14-83A298240A49}" srcOrd="1" destOrd="0" presId="urn:microsoft.com/office/officeart/2005/8/layout/radial1"/>
     <dgm:cxn modelId="{0D53BAD6-5587-497D-B004-16228AA771FA}" type="presOf" srcId="{97BDDB0E-7BB4-40F0-B54F-BD037FA1B902}" destId="{2EC2BD0D-C97D-41AD-AE96-03BDFEBCF029}" srcOrd="1" destOrd="0" presId="urn:microsoft.com/office/officeart/2005/8/layout/radial1"/>
-    <dgm:cxn modelId="{1E09B44D-7CCE-4DC9-81BB-069BF617DFCC}" type="presOf" srcId="{2D019032-8DF9-427F-9EED-A44F575B2797}" destId="{413CE0EE-DEA9-4DCD-BDC4-1C706C61D460}" srcOrd="0" destOrd="0" presId="urn:microsoft.com/office/officeart/2005/8/layout/radial1"/>
-    <dgm:cxn modelId="{C0C1D6EC-C3F7-43A0-8286-A81A49676574}" type="presOf" srcId="{13BDC813-0B90-48F6-A0DA-2BF83E4323AC}" destId="{4478A666-3F40-47DC-9706-1A123FB90CD7}" srcOrd="0" destOrd="0" presId="urn:microsoft.com/office/officeart/2005/8/layout/radial1"/>
     <dgm:cxn modelId="{6C542AD7-9F6C-4904-8154-4DB6F5BAB2C6}" type="presOf" srcId="{D68FB0A1-64AF-4719-89C0-1735534AEBB3}" destId="{689B2ECA-B910-4525-96D0-2E5738D025FB}" srcOrd="0" destOrd="0" presId="urn:microsoft.com/office/officeart/2005/8/layout/radial1"/>
+    <dgm:cxn modelId="{D9DDA6FC-B3AF-42F0-885F-BC9324E7B391}" srcId="{E285215F-F7D3-426D-869F-A205F1C4BF2E}" destId="{2D019032-8DF9-427F-9EED-A44F575B2797}" srcOrd="0" destOrd="0" parTransId="{8AA4E754-3065-44F5-9AA8-EF9AEDF6D0CC}" sibTransId="{30EE830B-DF74-41F0-84DB-53F31DAABAD3}"/>
+    <dgm:cxn modelId="{3BF4C620-5748-44EE-B326-B6A235235640}" type="presOf" srcId="{E285215F-F7D3-426D-869F-A205F1C4BF2E}" destId="{72F65768-CD9D-4B58-9D5F-6AF83E4586D6}" srcOrd="0" destOrd="0" presId="urn:microsoft.com/office/officeart/2005/8/layout/radial1"/>
+    <dgm:cxn modelId="{74818AC1-E27C-4825-80D9-0F19D3D9F7F1}" type="presOf" srcId="{97BDDB0E-7BB4-40F0-B54F-BD037FA1B902}" destId="{B3663269-5A54-41DC-AC8E-9D1288DD3DD7}" srcOrd="0" destOrd="0" presId="urn:microsoft.com/office/officeart/2005/8/layout/radial1"/>
+    <dgm:cxn modelId="{ECF25E4C-CEEF-4807-A6D7-63B7905F0BFA}" type="presOf" srcId="{8AA4E754-3065-44F5-9AA8-EF9AEDF6D0CC}" destId="{54647140-69E4-41A6-A8C6-AB935EBE7A65}" srcOrd="0" destOrd="0" presId="urn:microsoft.com/office/officeart/2005/8/layout/radial1"/>
+    <dgm:cxn modelId="{6FD336A7-E108-4185-B758-E5874418662D}" type="presOf" srcId="{E8090202-8229-492D-BC32-089543CCF403}" destId="{0A0683A7-FFDC-4669-BD40-6CB23803F38E}" srcOrd="1" destOrd="0" presId="urn:microsoft.com/office/officeart/2005/8/layout/radial1"/>
     <dgm:cxn modelId="{03F4B17E-2D55-43A0-9BF1-80251250F7BC}" srcId="{E285215F-F7D3-426D-869F-A205F1C4BF2E}" destId="{01ABCA04-BD82-4076-B9BE-56A01E6D25B7}" srcOrd="3" destOrd="0" parTransId="{CC34B6BB-23B2-49FD-A406-648B3086DF41}" sibTransId="{D16D7ECD-6375-4618-9E03-47DC25F83BF1}"/>
-    <dgm:cxn modelId="{08254CBE-4811-4986-8DE2-9E4B7A454787}" type="presOf" srcId="{01ABCA04-BD82-4076-B9BE-56A01E6D25B7}" destId="{8DF26142-863A-4361-A75A-660F7E95FF6B}" srcOrd="0" destOrd="0" presId="urn:microsoft.com/office/officeart/2005/8/layout/radial1"/>
+    <dgm:cxn modelId="{AC3B1524-9D52-4402-9771-A77FE22DE7C0}" type="presOf" srcId="{42D28648-708A-480E-87B5-ED6BB14FCE43}" destId="{B1CC1C9D-109B-4BE0-BB0C-6AFEF4A7F041}" srcOrd="1" destOrd="0" presId="urn:microsoft.com/office/officeart/2005/8/layout/radial1"/>
+    <dgm:cxn modelId="{6F9821E4-88B8-49FA-9C35-03C885E83814}" type="presOf" srcId="{CC34B6BB-23B2-49FD-A406-648B3086DF41}" destId="{523B1C70-F75A-4619-9182-0CA1139F6CA0}" srcOrd="0" destOrd="0" presId="urn:microsoft.com/office/officeart/2005/8/layout/radial1"/>
     <dgm:cxn modelId="{A63ACAD1-AF14-454B-8F2D-1BB2DA64D7F5}" srcId="{E285215F-F7D3-426D-869F-A205F1C4BF2E}" destId="{B69C2618-690B-42BD-8094-89775B7AB89D}" srcOrd="2" destOrd="0" parTransId="{42D28648-708A-480E-87B5-ED6BB14FCE43}" sibTransId="{D590987A-3E82-41C4-96C2-43795618FC36}"/>
     <dgm:cxn modelId="{FE2AA457-9C4C-427B-9E93-76CC873B5588}" type="presParOf" srcId="{1C206003-3862-42FC-8D0D-5CB969C4D4D5}" destId="{72F65768-CD9D-4B58-9D5F-6AF83E4586D6}" srcOrd="0" destOrd="0" presId="urn:microsoft.com/office/officeart/2005/8/layout/radial1"/>
     <dgm:cxn modelId="{4FA6325F-8D94-44F8-A8BC-BD0005E67555}" type="presParOf" srcId="{1C206003-3862-42FC-8D0D-5CB969C4D4D5}" destId="{54647140-69E4-41A6-A8C6-AB935EBE7A65}" srcOrd="1" destOrd="0" presId="urn:microsoft.com/office/officeart/2005/8/layout/radial1"/>
@@ -10232,29 +10232,29 @@
     </dgm:pt>
   </dgm:ptLst>
   <dgm:cxnLst>
+    <dgm:cxn modelId="{2B5472EE-30B5-45F8-AB78-45AF2AD0905E}" type="presOf" srcId="{2D019032-8DF9-427F-9EED-A44F575B2797}" destId="{413CE0EE-DEA9-4DCD-BDC4-1C706C61D460}" srcOrd="0" destOrd="0" presId="urn:microsoft.com/office/officeart/2005/8/layout/radial1"/>
+    <dgm:cxn modelId="{3FD2DD46-48CF-4EEA-AFEE-20736F249673}" type="presOf" srcId="{01ABCA04-BD82-4076-B9BE-56A01E6D25B7}" destId="{8DF26142-863A-4361-A75A-660F7E95FF6B}" srcOrd="0" destOrd="0" presId="urn:microsoft.com/office/officeart/2005/8/layout/radial1"/>
+    <dgm:cxn modelId="{854B8A91-F88E-40C2-919D-C62A80E0E697}" type="presOf" srcId="{8AA4E754-3065-44F5-9AA8-EF9AEDF6D0CC}" destId="{93D91C59-4B1B-4428-99CC-CD38ED6D35DF}" srcOrd="1" destOrd="0" presId="urn:microsoft.com/office/officeart/2005/8/layout/radial1"/>
+    <dgm:cxn modelId="{F430D4D6-D0C3-4BB9-874B-772CF8E440BE}" type="presOf" srcId="{CC34B6BB-23B2-49FD-A406-648B3086DF41}" destId="{523B1C70-F75A-4619-9182-0CA1139F6CA0}" srcOrd="0" destOrd="0" presId="urn:microsoft.com/office/officeart/2005/8/layout/radial1"/>
+    <dgm:cxn modelId="{B567AAB4-3DE6-4139-9AC3-E6A647EA5067}" type="presOf" srcId="{D68FB0A1-64AF-4719-89C0-1735534AEBB3}" destId="{689B2ECA-B910-4525-96D0-2E5738D025FB}" srcOrd="0" destOrd="0" presId="urn:microsoft.com/office/officeart/2005/8/layout/radial1"/>
+    <dgm:cxn modelId="{7018618F-A5F5-4526-8872-F6E893EB18E7}" type="presOf" srcId="{E285215F-F7D3-426D-869F-A205F1C4BF2E}" destId="{72F65768-CD9D-4B58-9D5F-6AF83E4586D6}" srcOrd="0" destOrd="0" presId="urn:microsoft.com/office/officeart/2005/8/layout/radial1"/>
     <dgm:cxn modelId="{4EF8CBDC-80B8-42A1-8E4B-63967314F5FB}" type="presOf" srcId="{97BDDB0E-7BB4-40F0-B54F-BD037FA1B902}" destId="{B3663269-5A54-41DC-AC8E-9D1288DD3DD7}" srcOrd="0" destOrd="0" presId="urn:microsoft.com/office/officeart/2005/8/layout/radial1"/>
+    <dgm:cxn modelId="{48531F3B-AC7F-41FF-9266-0ED1F22AC116}" type="presOf" srcId="{E8090202-8229-492D-BC32-089543CCF403}" destId="{0A0683A7-FFDC-4669-BD40-6CB23803F38E}" srcOrd="1" destOrd="0" presId="urn:microsoft.com/office/officeart/2005/8/layout/radial1"/>
+    <dgm:cxn modelId="{98583DE1-DA3F-467E-9667-A8B4055EBCB8}" type="presOf" srcId="{CC34B6BB-23B2-49FD-A406-648B3086DF41}" destId="{6C30350E-651F-4A6F-AC14-83A298240A49}" srcOrd="1" destOrd="0" presId="urn:microsoft.com/office/officeart/2005/8/layout/radial1"/>
+    <dgm:cxn modelId="{D9DDA6FC-B3AF-42F0-885F-BC9324E7B391}" srcId="{E285215F-F7D3-426D-869F-A205F1C4BF2E}" destId="{2D019032-8DF9-427F-9EED-A44F575B2797}" srcOrd="0" destOrd="0" parTransId="{8AA4E754-3065-44F5-9AA8-EF9AEDF6D0CC}" sibTransId="{30EE830B-DF74-41F0-84DB-53F31DAABAD3}"/>
+    <dgm:cxn modelId="{BC49E93C-1369-426D-B96C-233AEB75340C}" type="presOf" srcId="{B69C2618-690B-42BD-8094-89775B7AB89D}" destId="{3ED18D1C-2396-4751-93D8-F6C161B378DD}" srcOrd="0" destOrd="0" presId="urn:microsoft.com/office/officeart/2005/8/layout/radial1"/>
+    <dgm:cxn modelId="{F7E7E5C3-A047-44B7-A4A9-ED9D28168330}" type="presOf" srcId="{8AA4E754-3065-44F5-9AA8-EF9AEDF6D0CC}" destId="{54647140-69E4-41A6-A8C6-AB935EBE7A65}" srcOrd="0" destOrd="0" presId="urn:microsoft.com/office/officeart/2005/8/layout/radial1"/>
+    <dgm:cxn modelId="{6C89B93E-0410-436C-8720-657EA54B4E37}" type="presOf" srcId="{97BDDB0E-7BB4-40F0-B54F-BD037FA1B902}" destId="{2EC2BD0D-C97D-41AD-AE96-03BDFEBCF029}" srcOrd="1" destOrd="0" presId="urn:microsoft.com/office/officeart/2005/8/layout/radial1"/>
+    <dgm:cxn modelId="{5D2E581C-9A3C-4C7B-8DB9-0B388BCA1B6F}" srcId="{E285215F-F7D3-426D-869F-A205F1C4BF2E}" destId="{D68FB0A1-64AF-4719-89C0-1735534AEBB3}" srcOrd="4" destOrd="0" parTransId="{97BDDB0E-7BB4-40F0-B54F-BD037FA1B902}" sibTransId="{CA0EB4F4-2857-4F3B-B099-390373A5912F}"/>
     <dgm:cxn modelId="{4E45A5E4-3491-4C53-85D5-EB0A6F589374}" srcId="{E285215F-F7D3-426D-869F-A205F1C4BF2E}" destId="{13BDC813-0B90-48F6-A0DA-2BF83E4323AC}" srcOrd="1" destOrd="0" parTransId="{E8090202-8229-492D-BC32-089543CCF403}" sibTransId="{430D8C41-AA6A-488F-A2C6-FE86BBA67565}"/>
     <dgm:cxn modelId="{712F59E6-9F77-49BE-896E-6AB661489231}" srcId="{A50B2181-E5A6-44A1-8756-379E11E86230}" destId="{E285215F-F7D3-426D-869F-A205F1C4BF2E}" srcOrd="0" destOrd="0" parTransId="{C88ED351-B087-4B5B-B036-8A79F85B9430}" sibTransId="{8F134DCA-F37E-4B6B-8D99-CDA93A04CBF7}"/>
-    <dgm:cxn modelId="{BC49E93C-1369-426D-B96C-233AEB75340C}" type="presOf" srcId="{B69C2618-690B-42BD-8094-89775B7AB89D}" destId="{3ED18D1C-2396-4751-93D8-F6C161B378DD}" srcOrd="0" destOrd="0" presId="urn:microsoft.com/office/officeart/2005/8/layout/radial1"/>
+    <dgm:cxn modelId="{B1EB0F66-DB6F-4A20-82E0-AE6414EABB7A}" type="presOf" srcId="{13BDC813-0B90-48F6-A0DA-2BF83E4323AC}" destId="{4478A666-3F40-47DC-9706-1A123FB90CD7}" srcOrd="0" destOrd="0" presId="urn:microsoft.com/office/officeart/2005/8/layout/radial1"/>
+    <dgm:cxn modelId="{04E893F7-3A55-4951-BD13-0044B62AA74C}" type="presOf" srcId="{A50B2181-E5A6-44A1-8756-379E11E86230}" destId="{1C206003-3862-42FC-8D0D-5CB969C4D4D5}" srcOrd="0" destOrd="0" presId="urn:microsoft.com/office/officeart/2005/8/layout/radial1"/>
+    <dgm:cxn modelId="{53801DC8-A0F6-45D3-AF7C-4ED0EAAAEFDD}" type="presOf" srcId="{42D28648-708A-480E-87B5-ED6BB14FCE43}" destId="{B1CC1C9D-109B-4BE0-BB0C-6AFEF4A7F041}" srcOrd="1" destOrd="0" presId="urn:microsoft.com/office/officeart/2005/8/layout/radial1"/>
+    <dgm:cxn modelId="{03F4B17E-2D55-43A0-9BF1-80251250F7BC}" srcId="{E285215F-F7D3-426D-869F-A205F1C4BF2E}" destId="{01ABCA04-BD82-4076-B9BE-56A01E6D25B7}" srcOrd="3" destOrd="0" parTransId="{CC34B6BB-23B2-49FD-A406-648B3086DF41}" sibTransId="{D16D7ECD-6375-4618-9E03-47DC25F83BF1}"/>
+    <dgm:cxn modelId="{74CC25E1-60C5-4DAD-9653-061D19F8D36D}" type="presOf" srcId="{42D28648-708A-480E-87B5-ED6BB14FCE43}" destId="{004EB149-5DCA-4BB3-966A-0CD4E4B3D794}" srcOrd="0" destOrd="0" presId="urn:microsoft.com/office/officeart/2005/8/layout/radial1"/>
     <dgm:cxn modelId="{BDFEA5B4-AB3F-4065-8D8F-22CAF2F28CC1}" type="presOf" srcId="{E8090202-8229-492D-BC32-089543CCF403}" destId="{5CFD2702-8B4E-448D-9A07-BA386B2BDABF}" srcOrd="0" destOrd="0" presId="urn:microsoft.com/office/officeart/2005/8/layout/radial1"/>
-    <dgm:cxn modelId="{854B8A91-F88E-40C2-919D-C62A80E0E697}" type="presOf" srcId="{8AA4E754-3065-44F5-9AA8-EF9AEDF6D0CC}" destId="{93D91C59-4B1B-4428-99CC-CD38ED6D35DF}" srcOrd="1" destOrd="0" presId="urn:microsoft.com/office/officeart/2005/8/layout/radial1"/>
-    <dgm:cxn modelId="{6C89B93E-0410-436C-8720-657EA54B4E37}" type="presOf" srcId="{97BDDB0E-7BB4-40F0-B54F-BD037FA1B902}" destId="{2EC2BD0D-C97D-41AD-AE96-03BDFEBCF029}" srcOrd="1" destOrd="0" presId="urn:microsoft.com/office/officeart/2005/8/layout/radial1"/>
-    <dgm:cxn modelId="{5D2E581C-9A3C-4C7B-8DB9-0B388BCA1B6F}" srcId="{E285215F-F7D3-426D-869F-A205F1C4BF2E}" destId="{D68FB0A1-64AF-4719-89C0-1735534AEBB3}" srcOrd="4" destOrd="0" parTransId="{97BDDB0E-7BB4-40F0-B54F-BD037FA1B902}" sibTransId="{CA0EB4F4-2857-4F3B-B099-390373A5912F}"/>
-    <dgm:cxn modelId="{F7E7E5C3-A047-44B7-A4A9-ED9D28168330}" type="presOf" srcId="{8AA4E754-3065-44F5-9AA8-EF9AEDF6D0CC}" destId="{54647140-69E4-41A6-A8C6-AB935EBE7A65}" srcOrd="0" destOrd="0" presId="urn:microsoft.com/office/officeart/2005/8/layout/radial1"/>
-    <dgm:cxn modelId="{74CC25E1-60C5-4DAD-9653-061D19F8D36D}" type="presOf" srcId="{42D28648-708A-480E-87B5-ED6BB14FCE43}" destId="{004EB149-5DCA-4BB3-966A-0CD4E4B3D794}" srcOrd="0" destOrd="0" presId="urn:microsoft.com/office/officeart/2005/8/layout/radial1"/>
-    <dgm:cxn modelId="{B1EB0F66-DB6F-4A20-82E0-AE6414EABB7A}" type="presOf" srcId="{13BDC813-0B90-48F6-A0DA-2BF83E4323AC}" destId="{4478A666-3F40-47DC-9706-1A123FB90CD7}" srcOrd="0" destOrd="0" presId="urn:microsoft.com/office/officeart/2005/8/layout/radial1"/>
-    <dgm:cxn modelId="{3FD2DD46-48CF-4EEA-AFEE-20736F249673}" type="presOf" srcId="{01ABCA04-BD82-4076-B9BE-56A01E6D25B7}" destId="{8DF26142-863A-4361-A75A-660F7E95FF6B}" srcOrd="0" destOrd="0" presId="urn:microsoft.com/office/officeart/2005/8/layout/radial1"/>
-    <dgm:cxn modelId="{D9DDA6FC-B3AF-42F0-885F-BC9324E7B391}" srcId="{E285215F-F7D3-426D-869F-A205F1C4BF2E}" destId="{2D019032-8DF9-427F-9EED-A44F575B2797}" srcOrd="0" destOrd="0" parTransId="{8AA4E754-3065-44F5-9AA8-EF9AEDF6D0CC}" sibTransId="{30EE830B-DF74-41F0-84DB-53F31DAABAD3}"/>
-    <dgm:cxn modelId="{03F4B17E-2D55-43A0-9BF1-80251250F7BC}" srcId="{E285215F-F7D3-426D-869F-A205F1C4BF2E}" destId="{01ABCA04-BD82-4076-B9BE-56A01E6D25B7}" srcOrd="3" destOrd="0" parTransId="{CC34B6BB-23B2-49FD-A406-648B3086DF41}" sibTransId="{D16D7ECD-6375-4618-9E03-47DC25F83BF1}"/>
-    <dgm:cxn modelId="{2B5472EE-30B5-45F8-AB78-45AF2AD0905E}" type="presOf" srcId="{2D019032-8DF9-427F-9EED-A44F575B2797}" destId="{413CE0EE-DEA9-4DCD-BDC4-1C706C61D460}" srcOrd="0" destOrd="0" presId="urn:microsoft.com/office/officeart/2005/8/layout/radial1"/>
-    <dgm:cxn modelId="{53801DC8-A0F6-45D3-AF7C-4ED0EAAAEFDD}" type="presOf" srcId="{42D28648-708A-480E-87B5-ED6BB14FCE43}" destId="{B1CC1C9D-109B-4BE0-BB0C-6AFEF4A7F041}" srcOrd="1" destOrd="0" presId="urn:microsoft.com/office/officeart/2005/8/layout/radial1"/>
-    <dgm:cxn modelId="{98583DE1-DA3F-467E-9667-A8B4055EBCB8}" type="presOf" srcId="{CC34B6BB-23B2-49FD-A406-648B3086DF41}" destId="{6C30350E-651F-4A6F-AC14-83A298240A49}" srcOrd="1" destOrd="0" presId="urn:microsoft.com/office/officeart/2005/8/layout/radial1"/>
-    <dgm:cxn modelId="{48531F3B-AC7F-41FF-9266-0ED1F22AC116}" type="presOf" srcId="{E8090202-8229-492D-BC32-089543CCF403}" destId="{0A0683A7-FFDC-4669-BD40-6CB23803F38E}" srcOrd="1" destOrd="0" presId="urn:microsoft.com/office/officeart/2005/8/layout/radial1"/>
-    <dgm:cxn modelId="{B567AAB4-3DE6-4139-9AC3-E6A647EA5067}" type="presOf" srcId="{D68FB0A1-64AF-4719-89C0-1735534AEBB3}" destId="{689B2ECA-B910-4525-96D0-2E5738D025FB}" srcOrd="0" destOrd="0" presId="urn:microsoft.com/office/officeart/2005/8/layout/radial1"/>
-    <dgm:cxn modelId="{F430D4D6-D0C3-4BB9-874B-772CF8E440BE}" type="presOf" srcId="{CC34B6BB-23B2-49FD-A406-648B3086DF41}" destId="{523B1C70-F75A-4619-9182-0CA1139F6CA0}" srcOrd="0" destOrd="0" presId="urn:microsoft.com/office/officeart/2005/8/layout/radial1"/>
     <dgm:cxn modelId="{A63ACAD1-AF14-454B-8F2D-1BB2DA64D7F5}" srcId="{E285215F-F7D3-426D-869F-A205F1C4BF2E}" destId="{B69C2618-690B-42BD-8094-89775B7AB89D}" srcOrd="2" destOrd="0" parTransId="{42D28648-708A-480E-87B5-ED6BB14FCE43}" sibTransId="{D590987A-3E82-41C4-96C2-43795618FC36}"/>
-    <dgm:cxn modelId="{04E893F7-3A55-4951-BD13-0044B62AA74C}" type="presOf" srcId="{A50B2181-E5A6-44A1-8756-379E11E86230}" destId="{1C206003-3862-42FC-8D0D-5CB969C4D4D5}" srcOrd="0" destOrd="0" presId="urn:microsoft.com/office/officeart/2005/8/layout/radial1"/>
-    <dgm:cxn modelId="{7018618F-A5F5-4526-8872-F6E893EB18E7}" type="presOf" srcId="{E285215F-F7D3-426D-869F-A205F1C4BF2E}" destId="{72F65768-CD9D-4B58-9D5F-6AF83E4586D6}" srcOrd="0" destOrd="0" presId="urn:microsoft.com/office/officeart/2005/8/layout/radial1"/>
     <dgm:cxn modelId="{8AD75C9F-29D5-41A8-ADBE-B007423746F8}" type="presParOf" srcId="{1C206003-3862-42FC-8D0D-5CB969C4D4D5}" destId="{72F65768-CD9D-4B58-9D5F-6AF83E4586D6}" srcOrd="0" destOrd="0" presId="urn:microsoft.com/office/officeart/2005/8/layout/radial1"/>
     <dgm:cxn modelId="{348606A0-5FCE-4313-A923-58C406C84925}" type="presParOf" srcId="{1C206003-3862-42FC-8D0D-5CB969C4D4D5}" destId="{54647140-69E4-41A6-A8C6-AB935EBE7A65}" srcOrd="1" destOrd="0" presId="urn:microsoft.com/office/officeart/2005/8/layout/radial1"/>
     <dgm:cxn modelId="{2A3A7B04-5CCE-48F3-8B78-065D591A6F90}" type="presParOf" srcId="{54647140-69E4-41A6-A8C6-AB935EBE7A65}" destId="{93D91C59-4B1B-4428-99CC-CD38ED6D35DF}" srcOrd="0" destOrd="0" presId="urn:microsoft.com/office/officeart/2005/8/layout/radial1"/>
@@ -26354,7 +26354,7 @@
           <a:p>
             <a:fld id="{C973C2AE-EF56-47BF-8FFD-7FC0EC594EBF}" type="datetimeFigureOut">
               <a:rPr lang="en-US"/>
-              <a:t>2/19/2014</a:t>
+              <a:t>2/23/2014</a:t>
             </a:fld>
             <a:endParaRPr/>
           </a:p>
@@ -26519,7 +26519,7 @@
           <a:p>
             <a:fld id="{099F0E23-F7ED-4F2A-A714-D2035184D6FA}" type="datetimeFigureOut">
               <a:rPr lang="en-US"/>
-              <a:t>2/19/2014</a:t>
+              <a:t>2/23/2014</a:t>
             </a:fld>
             <a:endParaRPr/>
           </a:p>
@@ -26928,7 +26928,7 @@
           <a:p>
             <a:fld id="{A8224893-DBDA-4BFA-9CE1-4BFE7CD0F8CF}" type="datetime1">
               <a:rPr lang="en-US"/>
-              <a:t>2/19/2014</a:t>
+              <a:t>2/23/2014</a:t>
             </a:fld>
             <a:endParaRPr/>
           </a:p>
@@ -27098,7 +27098,7 @@
           <a:p>
             <a:fld id="{5F4E5243-F52A-4D37-9694-EB26C6C31910}" type="datetime1">
               <a:rPr lang="en-US"/>
-              <a:t>2/19/2014</a:t>
+              <a:t>2/23/2014</a:t>
             </a:fld>
             <a:endParaRPr/>
           </a:p>
@@ -27278,7 +27278,7 @@
           <a:p>
             <a:fld id="{3A77B6E1-634A-48DC-9E8B-D894023267EF}" type="datetime1">
               <a:rPr lang="en-US"/>
-              <a:t>2/19/2014</a:t>
+              <a:t>2/23/2014</a:t>
             </a:fld>
             <a:endParaRPr/>
           </a:p>
@@ -27448,7 +27448,7 @@
           <a:p>
             <a:fld id="{7B2D3E9E-A95C-48F2-B4BF-A71542E0BE9A}" type="datetime1">
               <a:rPr lang="en-US"/>
-              <a:t>2/19/2014</a:t>
+              <a:t>2/23/2014</a:t>
             </a:fld>
             <a:endParaRPr/>
           </a:p>
@@ -27699,7 +27699,7 @@
           <a:p>
             <a:fld id="{A50F84E2-2D7A-43CF-AC90-352A289A783A}" type="datetime1">
               <a:rPr lang="en-US"/>
-              <a:t>2/19/2014</a:t>
+              <a:t>2/23/2014</a:t>
             </a:fld>
             <a:endParaRPr/>
           </a:p>
@@ -27987,7 +27987,7 @@
           <a:p>
             <a:fld id="{F12952B5-7A2F-4CC8-B7CE-9234E21C2837}" type="datetime1">
               <a:rPr lang="en-US"/>
-              <a:t>2/19/2014</a:t>
+              <a:t>2/23/2014</a:t>
             </a:fld>
             <a:endParaRPr/>
           </a:p>
@@ -28384,7 +28384,7 @@
           <a:p>
             <a:fld id="{CE1DA07A-9201-4B4B-BAF2-015AFA30F520}" type="datetime1">
               <a:rPr lang="en-US"/>
-              <a:t>2/19/2014</a:t>
+              <a:t>2/23/2014</a:t>
             </a:fld>
             <a:endParaRPr/>
           </a:p>
@@ -28502,7 +28502,7 @@
           <a:p>
             <a:fld id="{73D7E00A-486F-4252-8B1D-E32645521F49}" type="datetime1">
               <a:rPr lang="en-US"/>
-              <a:t>2/19/2014</a:t>
+              <a:t>2/23/2014</a:t>
             </a:fld>
             <a:endParaRPr/>
           </a:p>
@@ -28627,7 +28627,7 @@
           <a:p>
             <a:fld id="{8DDF5F92-E675-4B36-9A60-69A962A68675}" type="datetime1">
               <a:rPr lang="en-US"/>
-              <a:t>2/19/2014</a:t>
+              <a:t>2/23/2014</a:t>
             </a:fld>
             <a:endParaRPr/>
           </a:p>
@@ -28911,7 +28911,7 @@
           <a:p>
             <a:fld id="{AF6E2C9B-5FA2-460D-9BE7-B0812FC2A6FF}" type="datetime1">
               <a:rPr lang="en-US"/>
-              <a:t>2/19/2014</a:t>
+              <a:t>2/23/2014</a:t>
             </a:fld>
             <a:endParaRPr/>
           </a:p>
@@ -29175,7 +29175,7 @@
           <a:p>
             <a:fld id="{1D374940-A916-4C8B-9648-02A2D3898F9E}" type="datetime1">
               <a:rPr lang="en-US"/>
-              <a:t>2/19/2014</a:t>
+              <a:t>2/23/2014</a:t>
             </a:fld>
             <a:endParaRPr/>
           </a:p>
@@ -29389,7 +29389,7 @@
           <a:p>
             <a:fld id="{5586B75A-687E-405C-8A0B-8D00578BA2C3}" type="datetime1">
               <a:rPr lang="en-US"/>
-              <a:t>2/19/2014</a:t>
+              <a:t>2/23/2014</a:t>
             </a:fld>
             <a:endParaRPr/>
           </a:p>
@@ -29893,18 +29893,22 @@
           <a:p>
             <a:r>
               <a:rPr lang="en-US" dirty="0" err="1" smtClean="0"/>
-              <a:t>Gerencimaneto</a:t>
+              <a:t>Gerenciamento</a:t>
             </a:r>
             <a:r>
               <a:rPr lang="en-US" dirty="0" smtClean="0"/>
-              <a:t> de </a:t>
+              <a:t> </a:t>
+            </a:r>
+            <a:r>
+              <a:rPr lang="en-US" dirty="0" smtClean="0"/>
+              <a:t>de </a:t>
             </a:r>
             <a:br>
               <a:rPr lang="en-US" dirty="0" smtClean="0"/>
             </a:br>
             <a:r>
               <a:rPr lang="en-US" dirty="0" err="1" smtClean="0"/>
-              <a:t>Requerimentos</a:t>
+              <a:t>Requisitos</a:t>
             </a:r>
             <a:r>
               <a:rPr lang="en-US" dirty="0" smtClean="0"/>
@@ -30011,7 +30015,7 @@
                     <a:schemeClr val="bg1"/>
                   </a:solidFill>
                 </a:rPr>
-                <a:t>Requerimentos</a:t>
+                <a:t>requisitos</a:t>
               </a:r>
               <a:endParaRPr lang="en-US" sz="2000" b="1" dirty="0">
                 <a:solidFill>
@@ -30052,12 +30056,8 @@
             <a:p>
               <a:pPr algn="ctr"/>
               <a:r>
-                <a:rPr lang="pt-BR" dirty="0"/>
-                <a:t>r</a:t>
-              </a:r>
-              <a:r>
                 <a:rPr lang="pt-BR" dirty="0" smtClean="0"/>
-                <a:t>equerimentos</a:t>
+                <a:t>requisitos</a:t>
               </a:r>
               <a:endParaRPr lang="en-US" dirty="0"/>
             </a:p>
@@ -30118,7 +30118,7 @@
               <a:pPr algn="ctr"/>
               <a:r>
                 <a:rPr lang="pt-BR" dirty="0" smtClean="0"/>
-                <a:t>requerimentos</a:t>
+                <a:t>requisitos</a:t>
               </a:r>
               <a:endParaRPr lang="en-US" dirty="0"/>
             </a:p>
@@ -30165,7 +30165,7 @@
               </a:r>
               <a:r>
                 <a:rPr lang="en-US" sz="1900" dirty="0" err="1" smtClean="0"/>
-                <a:t>requerimentos</a:t>
+                <a:t>requisitos</a:t>
               </a:r>
               <a:endParaRPr lang="en-US" sz="1900" dirty="0"/>
             </a:p>
@@ -30229,7 +30229,7 @@
               </a:r>
               <a:r>
                 <a:rPr lang="en-US" dirty="0" err="1" smtClean="0"/>
-                <a:t>requerimentos</a:t>
+                <a:t>requisitos</a:t>
               </a:r>
               <a:endParaRPr lang="en-US" dirty="0"/>
             </a:p>
@@ -30279,15 +30279,26 @@
               </a:r>
               <a:r>
                 <a:rPr lang="en-US" dirty="0" err="1" smtClean="0"/>
-                <a:t>requerimentos</a:t>
+                <a:t>requisitos</a:t>
               </a:r>
               <a:r>
-                <a:rPr lang="en-US" dirty="0"/>
+                <a:rPr lang="en-US" dirty="0" smtClean="0"/>
                 <a:t> </a:t>
               </a:r>
               <a:r>
                 <a:rPr lang="en-US" dirty="0" smtClean="0"/>
-                <a:t>e o </a:t>
+                <a:t>e </a:t>
+              </a:r>
+              <a:r>
+                <a:rPr lang="en-US" dirty="0" smtClean="0"/>
+                <a:t>o</a:t>
+              </a:r>
+            </a:p>
+            <a:p>
+              <a:pPr algn="ctr"/>
+              <a:r>
+                <a:rPr lang="en-US" dirty="0" smtClean="0"/>
+                <a:t> </a:t>
               </a:r>
               <a:r>
                 <a:rPr lang="en-US" dirty="0" err="1" smtClean="0"/>
@@ -30295,7 +30306,11 @@
               </a:r>
               <a:r>
                 <a:rPr lang="en-US" dirty="0" smtClean="0"/>
-                <a:t> do </a:t>
+                <a:t> </a:t>
+              </a:r>
+              <a:r>
+                <a:rPr lang="en-US" dirty="0" smtClean="0"/>
+                <a:t>do </a:t>
               </a:r>
               <a:r>
                 <a:rPr lang="en-US" dirty="0" err="1" smtClean="0"/>
@@ -30330,11 +30345,7 @@
           <a:p>
             <a:r>
               <a:rPr lang="pt-BR" i="1" dirty="0" smtClean="0"/>
-              <a:t>2014 </a:t>
-            </a:r>
-            <a:r>
-              <a:rPr lang="pt-BR" i="1" dirty="0" smtClean="0"/>
-              <a:t>– 2TDSB – FIAP – SP/São Paulo</a:t>
+              <a:t>2014 – 2TDSB – FIAP – SP/São Paulo</a:t>
             </a:r>
             <a:endParaRPr lang="en-US" i="1" dirty="0"/>
           </a:p>
@@ -30488,70 +30499,6 @@
           </a:p>
         </p:txBody>
       </p:sp>
-      <p:sp>
-        <p:nvSpPr>
-          <p:cNvPr id="4" name="Title 3"/>
-          <p:cNvSpPr>
-            <a:spLocks noGrp="1"/>
-          </p:cNvSpPr>
-          <p:nvPr>
-            <p:ph type="title"/>
-          </p:nvPr>
-        </p:nvSpPr>
-        <p:spPr>
-          <a:xfrm>
-            <a:off x="6405860" y="0"/>
-            <a:ext cx="5998128" cy="2057439"/>
-          </a:xfrm>
-        </p:spPr>
-        <p:txBody>
-          <a:bodyPr>
-            <a:noAutofit/>
-          </a:bodyPr>
-          <a:lstStyle/>
-          <a:p>
-            <a:r>
-              <a:rPr lang="en-US" sz="5400" dirty="0" err="1" smtClean="0"/>
-              <a:t>Gerencimaneto</a:t>
-            </a:r>
-            <a:r>
-              <a:rPr lang="en-US" sz="5400" dirty="0" smtClean="0"/>
-              <a:t> de </a:t>
-            </a:r>
-            <a:br>
-              <a:rPr lang="en-US" sz="5400" dirty="0" smtClean="0"/>
-            </a:br>
-            <a:r>
-              <a:rPr lang="en-US" sz="5400" dirty="0" err="1" smtClean="0"/>
-              <a:t>Requerimentos</a:t>
-            </a:r>
-            <a:r>
-              <a:rPr lang="en-US" sz="5400" dirty="0" smtClean="0"/>
-              <a:t/>
-            </a:r>
-            <a:br>
-              <a:rPr lang="en-US" sz="5400" dirty="0" smtClean="0"/>
-            </a:br>
-            <a:r>
-              <a:rPr lang="en-US" sz="4000" i="1" dirty="0" err="1" smtClean="0"/>
-              <a:t>Maturidade</a:t>
-            </a:r>
-            <a:r>
-              <a:rPr lang="en-US" sz="4000" i="1" dirty="0" smtClean="0"/>
-              <a:t> </a:t>
-            </a:r>
-            <a:r>
-              <a:rPr lang="en-US" sz="4000" i="1" dirty="0" err="1" smtClean="0"/>
-              <a:t>Nível</a:t>
-            </a:r>
-            <a:r>
-              <a:rPr lang="en-US" sz="4000" i="1" dirty="0" smtClean="0"/>
-              <a:t> 2</a:t>
-            </a:r>
-            <a:endParaRPr lang="en-US" sz="4000" i="1" dirty="0"/>
-          </a:p>
-        </p:txBody>
-      </p:sp>
       <p:grpSp>
         <p:nvGrpSpPr>
           <p:cNvPr id="6" name="Group 5"/>
@@ -30630,7 +30577,7 @@
                     <a:schemeClr val="bg1"/>
                   </a:solidFill>
                 </a:rPr>
-                <a:t>Requerimentos</a:t>
+                <a:t>requisitos</a:t>
               </a:r>
               <a:endParaRPr lang="en-US" sz="2000" b="1" dirty="0">
                 <a:solidFill>
@@ -30671,12 +30618,8 @@
             <a:p>
               <a:pPr algn="ctr"/>
               <a:r>
-                <a:rPr lang="pt-BR" dirty="0"/>
-                <a:t>r</a:t>
-              </a:r>
-              <a:r>
                 <a:rPr lang="pt-BR" dirty="0" smtClean="0"/>
-                <a:t>equerimentos</a:t>
+                <a:t>requisitos</a:t>
               </a:r>
               <a:endParaRPr lang="en-US" dirty="0"/>
             </a:p>
@@ -30737,7 +30680,7 @@
               <a:pPr algn="ctr"/>
               <a:r>
                 <a:rPr lang="pt-BR" dirty="0" smtClean="0"/>
-                <a:t>requerimentos</a:t>
+                <a:t>requisitos</a:t>
               </a:r>
               <a:endParaRPr lang="en-US" dirty="0"/>
             </a:p>
@@ -30784,7 +30727,7 @@
               </a:r>
               <a:r>
                 <a:rPr lang="en-US" sz="1900" dirty="0" err="1" smtClean="0"/>
-                <a:t>requerimentos</a:t>
+                <a:t>requisitos</a:t>
               </a:r>
               <a:endParaRPr lang="en-US" sz="1900" dirty="0"/>
             </a:p>
@@ -30848,77 +30791,7 @@
               </a:r>
               <a:r>
                 <a:rPr lang="en-US" dirty="0" err="1" smtClean="0"/>
-                <a:t>requerimentos</a:t>
-              </a:r>
-              <a:endParaRPr lang="en-US" dirty="0"/>
-            </a:p>
-          </p:txBody>
-        </p:sp>
-        <p:sp>
-          <p:nvSpPr>
-            <p:cNvPr id="29" name="TextBox 28"/>
-            <p:cNvSpPr txBox="1"/>
-            <p:nvPr/>
-          </p:nvSpPr>
-          <p:spPr>
-            <a:xfrm>
-              <a:off x="4946456" y="2165834"/>
-              <a:ext cx="2425890" cy="1200329"/>
-            </a:xfrm>
-            <a:prstGeom prst="rect">
-              <a:avLst/>
-            </a:prstGeom>
-            <a:noFill/>
-          </p:spPr>
-          <p:txBody>
-            <a:bodyPr wrap="square" rtlCol="0">
-              <a:spAutoFit/>
-            </a:bodyPr>
-            <a:lstStyle/>
-            <a:p>
-              <a:pPr algn="ctr"/>
-              <a:r>
-                <a:rPr lang="en-US" dirty="0" err="1" smtClean="0"/>
-                <a:t>Assegurar</a:t>
-              </a:r>
-              <a:r>
-                <a:rPr lang="en-US" dirty="0" smtClean="0"/>
-                <a:t> </a:t>
-              </a:r>
-            </a:p>
-            <a:p>
-              <a:pPr algn="ctr"/>
-              <a:r>
-                <a:rPr lang="en-US" dirty="0" err="1" smtClean="0"/>
-                <a:t>alinhamento</a:t>
-              </a:r>
-              <a:r>
-                <a:rPr lang="en-US" dirty="0" smtClean="0"/>
-                <a:t> entre </a:t>
-              </a:r>
-              <a:r>
-                <a:rPr lang="en-US" dirty="0" err="1" smtClean="0"/>
-                <a:t>requerimentos</a:t>
-              </a:r>
-              <a:r>
-                <a:rPr lang="en-US" dirty="0"/>
-                <a:t> </a:t>
-              </a:r>
-              <a:r>
-                <a:rPr lang="en-US" dirty="0" smtClean="0"/>
-                <a:t>e o </a:t>
-              </a:r>
-              <a:r>
-                <a:rPr lang="en-US" dirty="0" err="1" smtClean="0"/>
-                <a:t>plano</a:t>
-              </a:r>
-              <a:r>
-                <a:rPr lang="en-US" dirty="0" smtClean="0"/>
-                <a:t> do </a:t>
-              </a:r>
-              <a:r>
-                <a:rPr lang="en-US" dirty="0" err="1" smtClean="0"/>
-                <a:t>projeto</a:t>
+                <a:t>requisitos</a:t>
               </a:r>
               <a:endParaRPr lang="en-US" dirty="0"/>
             </a:p>
@@ -30949,11 +30822,7 @@
           <a:p>
             <a:r>
               <a:rPr lang="pt-BR" i="1" dirty="0" smtClean="0"/>
-              <a:t>2014 </a:t>
-            </a:r>
-            <a:r>
-              <a:rPr lang="pt-BR" i="1" dirty="0" smtClean="0"/>
-              <a:t>– 2TDSB – FIAP – SP/São Paulo</a:t>
+              <a:t>2014 – 2TDSB – FIAP – SP/São Paulo</a:t>
             </a:r>
             <a:endParaRPr lang="en-US" i="1" dirty="0"/>
           </a:p>
@@ -30968,7 +30837,7 @@
         <p:spPr>
           <a:xfrm>
             <a:off x="6892268" y="2242702"/>
-            <a:ext cx="5134891" cy="1200329"/>
+            <a:ext cx="5134891" cy="923330"/>
           </a:xfrm>
           <a:prstGeom prst="rect">
             <a:avLst/>
@@ -30998,22 +30867,8 @@
           </a:p>
           <a:p>
             <a:r>
-              <a:rPr lang="pt-BR" dirty="0">
-                <a:ln w="0">
-                  <a:noFill/>
-                </a:ln>
-                <a:effectLst/>
-              </a:rPr>
-              <a:t>"Lorem ipsum dolor sit amet, consectetur adipisicing elit, sed do eiusmod tempor incididunt ut labore et dolore magna aliqua</a:t>
-            </a:r>
-            <a:r>
-              <a:rPr lang="pt-BR" dirty="0" smtClean="0">
-                <a:ln w="0">
-                  <a:noFill/>
-                </a:ln>
-                <a:effectLst/>
-              </a:rPr>
-              <a:t>.”</a:t>
+              <a:rPr lang="pt-BR" b="1" i="1" dirty="0" smtClean="0"/>
+              <a:t>Entenda os objetivos dos requisitos com os provedores de requisitos.</a:t>
             </a:r>
             <a:endParaRPr lang="en-US" dirty="0">
               <a:ln w="0">
@@ -31021,6 +30876,154 @@
               </a:ln>
               <a:effectLst/>
             </a:endParaRPr>
+          </a:p>
+        </p:txBody>
+      </p:sp>
+      <p:sp>
+        <p:nvSpPr>
+          <p:cNvPr id="16" name="Title 3"/>
+          <p:cNvSpPr txBox="1">
+            <a:spLocks/>
+          </p:cNvSpPr>
+          <p:nvPr/>
+        </p:nvSpPr>
+        <p:spPr>
+          <a:xfrm>
+            <a:off x="7446636" y="-211436"/>
+            <a:ext cx="5998128" cy="2057439"/>
+          </a:xfrm>
+          <a:prstGeom prst="rect">
+            <a:avLst/>
+          </a:prstGeom>
+        </p:spPr>
+        <p:txBody>
+          <a:bodyPr vert="horz" lIns="91440" tIns="45720" rIns="91440" bIns="45720" rtlCol="0" anchor="ctr">
+            <a:noAutofit/>
+          </a:bodyPr>
+          <a:lstStyle>
+            <a:lvl1pPr algn="l" defTabSz="914400" rtl="0" eaLnBrk="1" latinLnBrk="0" hangingPunct="1">
+              <a:lnSpc>
+                <a:spcPct val="90000"/>
+              </a:lnSpc>
+              <a:spcBef>
+                <a:spcPct val="0"/>
+              </a:spcBef>
+              <a:buNone/>
+              <a:defRPr sz="4400" kern="1200">
+                <a:solidFill>
+                  <a:schemeClr val="tx1"/>
+                </a:solidFill>
+                <a:latin typeface="+mj-lt"/>
+                <a:ea typeface="+mj-ea"/>
+                <a:cs typeface="+mj-cs"/>
+              </a:defRPr>
+            </a:lvl1pPr>
+          </a:lstStyle>
+          <a:p>
+            <a:r>
+              <a:rPr lang="en-US" smtClean="0"/>
+              <a:t>Gerenciamento de </a:t>
+            </a:r>
+            <a:br>
+              <a:rPr lang="en-US" smtClean="0"/>
+            </a:br>
+            <a:r>
+              <a:rPr lang="en-US" smtClean="0"/>
+              <a:t>Requisitos</a:t>
+            </a:r>
+            <a:br>
+              <a:rPr lang="en-US" smtClean="0"/>
+            </a:br>
+            <a:r>
+              <a:rPr lang="en-US" sz="3200" i="1" smtClean="0"/>
+              <a:t>Maturidade Nível 2</a:t>
+            </a:r>
+            <a:endParaRPr lang="en-US" sz="3200" i="1" dirty="0"/>
+          </a:p>
+        </p:txBody>
+      </p:sp>
+      <p:sp>
+        <p:nvSpPr>
+          <p:cNvPr id="17" name="TextBox 16"/>
+          <p:cNvSpPr txBox="1"/>
+          <p:nvPr/>
+        </p:nvSpPr>
+        <p:spPr>
+          <a:xfrm>
+            <a:off x="-229551" y="2242702"/>
+            <a:ext cx="2425890" cy="1200329"/>
+          </a:xfrm>
+          <a:prstGeom prst="rect">
+            <a:avLst/>
+          </a:prstGeom>
+          <a:noFill/>
+        </p:spPr>
+        <p:txBody>
+          <a:bodyPr wrap="square" rtlCol="0">
+            <a:spAutoFit/>
+          </a:bodyPr>
+          <a:lstStyle/>
+          <a:p>
+            <a:pPr algn="ctr"/>
+            <a:r>
+              <a:rPr lang="en-US" dirty="0" err="1" smtClean="0"/>
+              <a:t>Assegurar</a:t>
+            </a:r>
+            <a:r>
+              <a:rPr lang="en-US" dirty="0" smtClean="0"/>
+              <a:t> </a:t>
+            </a:r>
+          </a:p>
+          <a:p>
+            <a:pPr algn="ctr"/>
+            <a:r>
+              <a:rPr lang="en-US" dirty="0" err="1" smtClean="0"/>
+              <a:t>alinhamento</a:t>
+            </a:r>
+            <a:r>
+              <a:rPr lang="en-US" dirty="0" smtClean="0"/>
+              <a:t> entre </a:t>
+            </a:r>
+            <a:r>
+              <a:rPr lang="en-US" dirty="0" err="1" smtClean="0"/>
+              <a:t>requisitos</a:t>
+            </a:r>
+            <a:r>
+              <a:rPr lang="en-US" dirty="0" smtClean="0"/>
+              <a:t> </a:t>
+            </a:r>
+            <a:r>
+              <a:rPr lang="en-US" dirty="0" smtClean="0"/>
+              <a:t>e </a:t>
+            </a:r>
+            <a:r>
+              <a:rPr lang="en-US" dirty="0" smtClean="0"/>
+              <a:t>o</a:t>
+            </a:r>
+          </a:p>
+          <a:p>
+            <a:pPr algn="ctr"/>
+            <a:r>
+              <a:rPr lang="en-US" dirty="0" smtClean="0"/>
+              <a:t> </a:t>
+            </a:r>
+            <a:r>
+              <a:rPr lang="en-US" dirty="0" err="1" smtClean="0"/>
+              <a:t>plano</a:t>
+            </a:r>
+            <a:r>
+              <a:rPr lang="en-US" dirty="0" smtClean="0"/>
+              <a:t> </a:t>
+            </a:r>
+            <a:r>
+              <a:rPr lang="en-US" dirty="0" smtClean="0"/>
+              <a:t>do </a:t>
+            </a:r>
+            <a:r>
+              <a:rPr lang="en-US" dirty="0" err="1" smtClean="0"/>
+              <a:t>projeto</a:t>
+            </a:r>
+            <a:endParaRPr lang="en-US" dirty="0"/>
           </a:p>
         </p:txBody>
       </p:sp>
@@ -31118,70 +31121,6 @@
           </a:p>
         </p:txBody>
       </p:sp>
-      <p:sp>
-        <p:nvSpPr>
-          <p:cNvPr id="4" name="Title 3"/>
-          <p:cNvSpPr>
-            <a:spLocks noGrp="1"/>
-          </p:cNvSpPr>
-          <p:nvPr>
-            <p:ph type="title"/>
-          </p:nvPr>
-        </p:nvSpPr>
-        <p:spPr>
-          <a:xfrm>
-            <a:off x="6405860" y="0"/>
-            <a:ext cx="5998128" cy="2057439"/>
-          </a:xfrm>
-        </p:spPr>
-        <p:txBody>
-          <a:bodyPr>
-            <a:noAutofit/>
-          </a:bodyPr>
-          <a:lstStyle/>
-          <a:p>
-            <a:r>
-              <a:rPr lang="en-US" sz="5400" dirty="0" err="1" smtClean="0"/>
-              <a:t>Gerencimaneto</a:t>
-            </a:r>
-            <a:r>
-              <a:rPr lang="en-US" sz="5400" dirty="0" smtClean="0"/>
-              <a:t> de </a:t>
-            </a:r>
-            <a:br>
-              <a:rPr lang="en-US" sz="5400" dirty="0" smtClean="0"/>
-            </a:br>
-            <a:r>
-              <a:rPr lang="en-US" sz="5400" dirty="0" err="1" smtClean="0"/>
-              <a:t>Requerimentos</a:t>
-            </a:r>
-            <a:r>
-              <a:rPr lang="en-US" sz="5400" dirty="0" smtClean="0"/>
-              <a:t/>
-            </a:r>
-            <a:br>
-              <a:rPr lang="en-US" sz="5400" dirty="0" smtClean="0"/>
-            </a:br>
-            <a:r>
-              <a:rPr lang="en-US" sz="4000" i="1" dirty="0" err="1" smtClean="0"/>
-              <a:t>Maturidade</a:t>
-            </a:r>
-            <a:r>
-              <a:rPr lang="en-US" sz="4000" i="1" dirty="0" smtClean="0"/>
-              <a:t> </a:t>
-            </a:r>
-            <a:r>
-              <a:rPr lang="en-US" sz="4000" i="1" dirty="0" err="1" smtClean="0"/>
-              <a:t>Nível</a:t>
-            </a:r>
-            <a:r>
-              <a:rPr lang="en-US" sz="4000" i="1" dirty="0" smtClean="0"/>
-              <a:t> 2</a:t>
-            </a:r>
-            <a:endParaRPr lang="en-US" sz="4000" i="1" dirty="0"/>
-          </a:p>
-        </p:txBody>
-      </p:sp>
       <p:grpSp>
         <p:nvGrpSpPr>
           <p:cNvPr id="6" name="Group 5"/>
@@ -31260,7 +31199,7 @@
                     <a:schemeClr val="bg1"/>
                   </a:solidFill>
                 </a:rPr>
-                <a:t>Requerimentos</a:t>
+                <a:t>requisitos</a:t>
               </a:r>
               <a:endParaRPr lang="en-US" sz="2000" b="1" dirty="0">
                 <a:solidFill>
@@ -31301,12 +31240,8 @@
             <a:p>
               <a:pPr algn="ctr"/>
               <a:r>
-                <a:rPr lang="pt-BR" dirty="0"/>
-                <a:t>r</a:t>
-              </a:r>
-              <a:r>
                 <a:rPr lang="pt-BR" dirty="0" smtClean="0"/>
-                <a:t>equerimentos</a:t>
+                <a:t>requisitos</a:t>
               </a:r>
               <a:endParaRPr lang="en-US" dirty="0"/>
             </a:p>
@@ -31367,7 +31302,7 @@
               <a:pPr algn="ctr"/>
               <a:r>
                 <a:rPr lang="pt-BR" dirty="0" smtClean="0"/>
-                <a:t>requerimentos</a:t>
+                <a:t>requisitos</a:t>
               </a:r>
               <a:endParaRPr lang="en-US" dirty="0"/>
             </a:p>
@@ -31414,7 +31349,7 @@
               </a:r>
               <a:r>
                 <a:rPr lang="en-US" sz="1900" dirty="0" err="1" smtClean="0"/>
-                <a:t>requerimentos</a:t>
+                <a:t>requisitos</a:t>
               </a:r>
               <a:endParaRPr lang="en-US" sz="1900" dirty="0"/>
             </a:p>
@@ -31478,77 +31413,7 @@
               </a:r>
               <a:r>
                 <a:rPr lang="en-US" dirty="0" err="1" smtClean="0"/>
-                <a:t>requerimentos</a:t>
-              </a:r>
-              <a:endParaRPr lang="en-US" dirty="0"/>
-            </a:p>
-          </p:txBody>
-        </p:sp>
-        <p:sp>
-          <p:nvSpPr>
-            <p:cNvPr id="29" name="TextBox 28"/>
-            <p:cNvSpPr txBox="1"/>
-            <p:nvPr/>
-          </p:nvSpPr>
-          <p:spPr>
-            <a:xfrm>
-              <a:off x="4946456" y="2165834"/>
-              <a:ext cx="2425890" cy="1200329"/>
-            </a:xfrm>
-            <a:prstGeom prst="rect">
-              <a:avLst/>
-            </a:prstGeom>
-            <a:noFill/>
-          </p:spPr>
-          <p:txBody>
-            <a:bodyPr wrap="square" rtlCol="0">
-              <a:spAutoFit/>
-            </a:bodyPr>
-            <a:lstStyle/>
-            <a:p>
-              <a:pPr algn="ctr"/>
-              <a:r>
-                <a:rPr lang="en-US" dirty="0" err="1" smtClean="0"/>
-                <a:t>Assegurar</a:t>
-              </a:r>
-              <a:r>
-                <a:rPr lang="en-US" dirty="0" smtClean="0"/>
-                <a:t> </a:t>
-              </a:r>
-            </a:p>
-            <a:p>
-              <a:pPr algn="ctr"/>
-              <a:r>
-                <a:rPr lang="en-US" dirty="0" err="1" smtClean="0"/>
-                <a:t>alinhamento</a:t>
-              </a:r>
-              <a:r>
-                <a:rPr lang="en-US" dirty="0" smtClean="0"/>
-                <a:t> entre </a:t>
-              </a:r>
-              <a:r>
-                <a:rPr lang="en-US" dirty="0" err="1" smtClean="0"/>
-                <a:t>requerimentos</a:t>
-              </a:r>
-              <a:r>
-                <a:rPr lang="en-US" dirty="0"/>
-                <a:t> </a:t>
-              </a:r>
-              <a:r>
-                <a:rPr lang="en-US" dirty="0" smtClean="0"/>
-                <a:t>e o </a:t>
-              </a:r>
-              <a:r>
-                <a:rPr lang="en-US" dirty="0" err="1" smtClean="0"/>
-                <a:t>plano</a:t>
-              </a:r>
-              <a:r>
-                <a:rPr lang="en-US" dirty="0" smtClean="0"/>
-                <a:t> do </a:t>
-              </a:r>
-              <a:r>
-                <a:rPr lang="en-US" dirty="0" err="1" smtClean="0"/>
-                <a:t>projeto</a:t>
+                <a:t>requisitos</a:t>
               </a:r>
               <a:endParaRPr lang="en-US" dirty="0"/>
             </a:p>
@@ -31579,11 +31444,7 @@
           <a:p>
             <a:r>
               <a:rPr lang="pt-BR" i="1" dirty="0" smtClean="0"/>
-              <a:t>2014 </a:t>
-            </a:r>
-            <a:r>
-              <a:rPr lang="pt-BR" i="1" dirty="0" smtClean="0"/>
-              <a:t>– 2TDSB – FIAP – SP/São Paulo</a:t>
+              <a:t>2014 – 2TDSB – FIAP – SP/São Paulo</a:t>
             </a:r>
             <a:endParaRPr lang="en-US" i="1" dirty="0"/>
           </a:p>
@@ -31598,7 +31459,7 @@
         <p:spPr>
           <a:xfrm>
             <a:off x="6892268" y="2242702"/>
-            <a:ext cx="5134891" cy="1200329"/>
+            <a:ext cx="5134891" cy="923330"/>
           </a:xfrm>
           <a:prstGeom prst="rect">
             <a:avLst/>
@@ -31618,12 +31479,156 @@
           </a:p>
           <a:p>
             <a:r>
-              <a:rPr lang="pt-BR" dirty="0"/>
-              <a:t>"Lorem ipsum dolor sit amet, consectetur adipisicing elit, sed do eiusmod tempor incididunt ut labore et dolore magna aliqua</a:t>
+              <a:rPr lang="pt-BR" b="1" i="1" dirty="0" smtClean="0"/>
+              <a:t>Fazer com que os participantes do projeto se empenhem em seguir os requisitos.</a:t>
+            </a:r>
+            <a:endParaRPr lang="en-US" dirty="0"/>
+          </a:p>
+        </p:txBody>
+      </p:sp>
+      <p:sp>
+        <p:nvSpPr>
+          <p:cNvPr id="16" name="Title 3"/>
+          <p:cNvSpPr txBox="1">
+            <a:spLocks/>
+          </p:cNvSpPr>
+          <p:nvPr/>
+        </p:nvSpPr>
+        <p:spPr>
+          <a:xfrm>
+            <a:off x="7446636" y="-211436"/>
+            <a:ext cx="5998128" cy="2057439"/>
+          </a:xfrm>
+          <a:prstGeom prst="rect">
+            <a:avLst/>
+          </a:prstGeom>
+        </p:spPr>
+        <p:txBody>
+          <a:bodyPr vert="horz" lIns="91440" tIns="45720" rIns="91440" bIns="45720" rtlCol="0" anchor="ctr">
+            <a:noAutofit/>
+          </a:bodyPr>
+          <a:lstStyle>
+            <a:lvl1pPr algn="l" defTabSz="914400" rtl="0" eaLnBrk="1" latinLnBrk="0" hangingPunct="1">
+              <a:lnSpc>
+                <a:spcPct val="90000"/>
+              </a:lnSpc>
+              <a:spcBef>
+                <a:spcPct val="0"/>
+              </a:spcBef>
+              <a:buNone/>
+              <a:defRPr sz="4400" kern="1200">
+                <a:solidFill>
+                  <a:schemeClr val="tx1"/>
+                </a:solidFill>
+                <a:latin typeface="+mj-lt"/>
+                <a:ea typeface="+mj-ea"/>
+                <a:cs typeface="+mj-cs"/>
+              </a:defRPr>
+            </a:lvl1pPr>
+          </a:lstStyle>
+          <a:p>
+            <a:r>
+              <a:rPr lang="en-US" smtClean="0"/>
+              <a:t>Gerenciamento de </a:t>
+            </a:r>
+            <a:br>
+              <a:rPr lang="en-US" smtClean="0"/>
+            </a:br>
+            <a:r>
+              <a:rPr lang="en-US" smtClean="0"/>
+              <a:t>Requisitos</a:t>
+            </a:r>
+            <a:br>
+              <a:rPr lang="en-US" smtClean="0"/>
+            </a:br>
+            <a:r>
+              <a:rPr lang="en-US" sz="3200" i="1" smtClean="0"/>
+              <a:t>Maturidade Nível 2</a:t>
+            </a:r>
+            <a:endParaRPr lang="en-US" sz="3200" i="1" dirty="0"/>
+          </a:p>
+        </p:txBody>
+      </p:sp>
+      <p:sp>
+        <p:nvSpPr>
+          <p:cNvPr id="17" name="TextBox 16"/>
+          <p:cNvSpPr txBox="1"/>
+          <p:nvPr/>
+        </p:nvSpPr>
+        <p:spPr>
+          <a:xfrm>
+            <a:off x="-229551" y="2242702"/>
+            <a:ext cx="2425890" cy="1200329"/>
+          </a:xfrm>
+          <a:prstGeom prst="rect">
+            <a:avLst/>
+          </a:prstGeom>
+          <a:noFill/>
+        </p:spPr>
+        <p:txBody>
+          <a:bodyPr wrap="square" rtlCol="0">
+            <a:spAutoFit/>
+          </a:bodyPr>
+          <a:lstStyle/>
+          <a:p>
+            <a:pPr algn="ctr"/>
+            <a:r>
+              <a:rPr lang="en-US" dirty="0" err="1" smtClean="0"/>
+              <a:t>Assegurar</a:t>
             </a:r>
             <a:r>
-              <a:rPr lang="pt-BR" dirty="0" smtClean="0"/>
-              <a:t>.”</a:t>
+              <a:rPr lang="en-US" dirty="0" smtClean="0"/>
+              <a:t> </a:t>
+            </a:r>
+          </a:p>
+          <a:p>
+            <a:pPr algn="ctr"/>
+            <a:r>
+              <a:rPr lang="en-US" dirty="0" err="1" smtClean="0"/>
+              <a:t>alinhamento</a:t>
+            </a:r>
+            <a:r>
+              <a:rPr lang="en-US" dirty="0" smtClean="0"/>
+              <a:t> entre </a:t>
+            </a:r>
+            <a:r>
+              <a:rPr lang="en-US" dirty="0" err="1" smtClean="0"/>
+              <a:t>requisitos</a:t>
+            </a:r>
+            <a:r>
+              <a:rPr lang="en-US" dirty="0" smtClean="0"/>
+              <a:t> </a:t>
+            </a:r>
+            <a:r>
+              <a:rPr lang="en-US" dirty="0" smtClean="0"/>
+              <a:t>e </a:t>
+            </a:r>
+            <a:r>
+              <a:rPr lang="en-US" dirty="0" smtClean="0"/>
+              <a:t>o</a:t>
+            </a:r>
+          </a:p>
+          <a:p>
+            <a:pPr algn="ctr"/>
+            <a:r>
+              <a:rPr lang="en-US" dirty="0" smtClean="0"/>
+              <a:t> </a:t>
+            </a:r>
+            <a:r>
+              <a:rPr lang="en-US" dirty="0" err="1" smtClean="0"/>
+              <a:t>plano</a:t>
+            </a:r>
+            <a:r>
+              <a:rPr lang="en-US" dirty="0" smtClean="0"/>
+              <a:t> </a:t>
+            </a:r>
+            <a:r>
+              <a:rPr lang="en-US" dirty="0" smtClean="0"/>
+              <a:t>do </a:t>
+            </a:r>
+            <a:r>
+              <a:rPr lang="en-US" dirty="0" err="1" smtClean="0"/>
+              <a:t>projeto</a:t>
             </a:r>
             <a:endParaRPr lang="en-US" dirty="0"/>
           </a:p>
@@ -31723,70 +31728,6 @@
           </a:p>
         </p:txBody>
       </p:sp>
-      <p:sp>
-        <p:nvSpPr>
-          <p:cNvPr id="4" name="Title 3"/>
-          <p:cNvSpPr>
-            <a:spLocks noGrp="1"/>
-          </p:cNvSpPr>
-          <p:nvPr>
-            <p:ph type="title"/>
-          </p:nvPr>
-        </p:nvSpPr>
-        <p:spPr>
-          <a:xfrm>
-            <a:off x="6405860" y="0"/>
-            <a:ext cx="5998128" cy="2057439"/>
-          </a:xfrm>
-        </p:spPr>
-        <p:txBody>
-          <a:bodyPr>
-            <a:noAutofit/>
-          </a:bodyPr>
-          <a:lstStyle/>
-          <a:p>
-            <a:r>
-              <a:rPr lang="en-US" sz="5400" dirty="0" err="1" smtClean="0"/>
-              <a:t>Gerencimaneto</a:t>
-            </a:r>
-            <a:r>
-              <a:rPr lang="en-US" sz="5400" dirty="0" smtClean="0"/>
-              <a:t> de </a:t>
-            </a:r>
-            <a:br>
-              <a:rPr lang="en-US" sz="5400" dirty="0" smtClean="0"/>
-            </a:br>
-            <a:r>
-              <a:rPr lang="en-US" sz="5400" dirty="0" err="1" smtClean="0"/>
-              <a:t>Requerimentos</a:t>
-            </a:r>
-            <a:r>
-              <a:rPr lang="en-US" sz="5400" dirty="0" smtClean="0"/>
-              <a:t/>
-            </a:r>
-            <a:br>
-              <a:rPr lang="en-US" sz="5400" dirty="0" smtClean="0"/>
-            </a:br>
-            <a:r>
-              <a:rPr lang="en-US" sz="4000" i="1" dirty="0" err="1" smtClean="0"/>
-              <a:t>Maturidade</a:t>
-            </a:r>
-            <a:r>
-              <a:rPr lang="en-US" sz="4000" i="1" dirty="0" smtClean="0"/>
-              <a:t> </a:t>
-            </a:r>
-            <a:r>
-              <a:rPr lang="en-US" sz="4000" i="1" dirty="0" err="1" smtClean="0"/>
-              <a:t>Nível</a:t>
-            </a:r>
-            <a:r>
-              <a:rPr lang="en-US" sz="4000" i="1" dirty="0" smtClean="0"/>
-              <a:t> 2</a:t>
-            </a:r>
-            <a:endParaRPr lang="en-US" sz="4000" i="1" dirty="0"/>
-          </a:p>
-        </p:txBody>
-      </p:sp>
       <p:grpSp>
         <p:nvGrpSpPr>
           <p:cNvPr id="6" name="Group 5"/>
@@ -31865,7 +31806,7 @@
                     <a:schemeClr val="bg1"/>
                   </a:solidFill>
                 </a:rPr>
-                <a:t>Requerimentos</a:t>
+                <a:t>requisitos</a:t>
               </a:r>
               <a:endParaRPr lang="en-US" sz="2000" b="1" dirty="0">
                 <a:solidFill>
@@ -31906,12 +31847,8 @@
             <a:p>
               <a:pPr algn="ctr"/>
               <a:r>
-                <a:rPr lang="pt-BR" dirty="0"/>
-                <a:t>r</a:t>
-              </a:r>
-              <a:r>
                 <a:rPr lang="pt-BR" dirty="0" smtClean="0"/>
-                <a:t>equerimentos</a:t>
+                <a:t>requisitos</a:t>
               </a:r>
               <a:endParaRPr lang="en-US" dirty="0"/>
             </a:p>
@@ -31972,7 +31909,7 @@
               <a:pPr algn="ctr"/>
               <a:r>
                 <a:rPr lang="pt-BR" dirty="0" smtClean="0"/>
-                <a:t>requerimentos</a:t>
+                <a:t>requisitos</a:t>
               </a:r>
               <a:endParaRPr lang="en-US" dirty="0"/>
             </a:p>
@@ -32019,7 +31956,7 @@
               </a:r>
               <a:r>
                 <a:rPr lang="en-US" sz="1900" dirty="0" err="1" smtClean="0"/>
-                <a:t>requerimentos</a:t>
+                <a:t>requisitos</a:t>
               </a:r>
               <a:endParaRPr lang="en-US" sz="1900" dirty="0"/>
             </a:p>
@@ -32083,77 +32020,7 @@
               </a:r>
               <a:r>
                 <a:rPr lang="en-US" dirty="0" err="1" smtClean="0"/>
-                <a:t>requerimentos</a:t>
-              </a:r>
-              <a:endParaRPr lang="en-US" dirty="0"/>
-            </a:p>
-          </p:txBody>
-        </p:sp>
-        <p:sp>
-          <p:nvSpPr>
-            <p:cNvPr id="29" name="TextBox 28"/>
-            <p:cNvSpPr txBox="1"/>
-            <p:nvPr/>
-          </p:nvSpPr>
-          <p:spPr>
-            <a:xfrm>
-              <a:off x="4946456" y="2165834"/>
-              <a:ext cx="2425890" cy="1200329"/>
-            </a:xfrm>
-            <a:prstGeom prst="rect">
-              <a:avLst/>
-            </a:prstGeom>
-            <a:noFill/>
-          </p:spPr>
-          <p:txBody>
-            <a:bodyPr wrap="square" rtlCol="0">
-              <a:spAutoFit/>
-            </a:bodyPr>
-            <a:lstStyle/>
-            <a:p>
-              <a:pPr algn="ctr"/>
-              <a:r>
-                <a:rPr lang="en-US" dirty="0" err="1" smtClean="0"/>
-                <a:t>Assegurar</a:t>
-              </a:r>
-              <a:r>
-                <a:rPr lang="en-US" dirty="0" smtClean="0"/>
-                <a:t> </a:t>
-              </a:r>
-            </a:p>
-            <a:p>
-              <a:pPr algn="ctr"/>
-              <a:r>
-                <a:rPr lang="en-US" dirty="0" err="1" smtClean="0"/>
-                <a:t>alinhamento</a:t>
-              </a:r>
-              <a:r>
-                <a:rPr lang="en-US" dirty="0" smtClean="0"/>
-                <a:t> entre </a:t>
-              </a:r>
-              <a:r>
-                <a:rPr lang="en-US" dirty="0" err="1" smtClean="0"/>
-                <a:t>requerimentos</a:t>
-              </a:r>
-              <a:r>
-                <a:rPr lang="en-US" dirty="0"/>
-                <a:t> </a:t>
-              </a:r>
-              <a:r>
-                <a:rPr lang="en-US" dirty="0" smtClean="0"/>
-                <a:t>e o </a:t>
-              </a:r>
-              <a:r>
-                <a:rPr lang="en-US" dirty="0" err="1" smtClean="0"/>
-                <a:t>plano</a:t>
-              </a:r>
-              <a:r>
-                <a:rPr lang="en-US" dirty="0" smtClean="0"/>
-                <a:t> do </a:t>
-              </a:r>
-              <a:r>
-                <a:rPr lang="en-US" dirty="0" err="1" smtClean="0"/>
-                <a:t>projeto</a:t>
+                <a:t>requisitos</a:t>
               </a:r>
               <a:endParaRPr lang="en-US" dirty="0"/>
             </a:p>
@@ -32184,11 +32051,7 @@
           <a:p>
             <a:r>
               <a:rPr lang="pt-BR" i="1" dirty="0" smtClean="0"/>
-              <a:t>2014 </a:t>
-            </a:r>
-            <a:r>
-              <a:rPr lang="pt-BR" i="1" dirty="0" smtClean="0"/>
-              <a:t>– 2TDSB – FIAP – SP/São Paulo</a:t>
+              <a:t>2014 – 2TDSB – FIAP – SP/São Paulo</a:t>
             </a:r>
             <a:endParaRPr lang="en-US" i="1" dirty="0"/>
           </a:p>
@@ -32203,7 +32066,7 @@
         <p:spPr>
           <a:xfrm>
             <a:off x="6892268" y="2242702"/>
-            <a:ext cx="5134891" cy="1200329"/>
+            <a:ext cx="5134891" cy="923330"/>
           </a:xfrm>
           <a:prstGeom prst="rect">
             <a:avLst/>
@@ -32223,12 +32086,156 @@
           </a:p>
           <a:p>
             <a:r>
-              <a:rPr lang="pt-BR" dirty="0"/>
-              <a:t>"Lorem ipsum dolor sit amet, consectetur adipisicing elit, sed do eiusmod tempor incididunt ut labore et dolore magna aliqua</a:t>
+              <a:rPr lang="pt-BR" b="1" i="1" dirty="0" smtClean="0"/>
+              <a:t>Gerenciar as mudanças dos requisitos enquanto eles se desenvolve no decorrer do projeto.</a:t>
+            </a:r>
+            <a:endParaRPr lang="en-US" dirty="0"/>
+          </a:p>
+        </p:txBody>
+      </p:sp>
+      <p:sp>
+        <p:nvSpPr>
+          <p:cNvPr id="16" name="Title 3"/>
+          <p:cNvSpPr txBox="1">
+            <a:spLocks/>
+          </p:cNvSpPr>
+          <p:nvPr/>
+        </p:nvSpPr>
+        <p:spPr>
+          <a:xfrm>
+            <a:off x="7446636" y="-211436"/>
+            <a:ext cx="5998128" cy="2057439"/>
+          </a:xfrm>
+          <a:prstGeom prst="rect">
+            <a:avLst/>
+          </a:prstGeom>
+        </p:spPr>
+        <p:txBody>
+          <a:bodyPr vert="horz" lIns="91440" tIns="45720" rIns="91440" bIns="45720" rtlCol="0" anchor="ctr">
+            <a:noAutofit/>
+          </a:bodyPr>
+          <a:lstStyle>
+            <a:lvl1pPr algn="l" defTabSz="914400" rtl="0" eaLnBrk="1" latinLnBrk="0" hangingPunct="1">
+              <a:lnSpc>
+                <a:spcPct val="90000"/>
+              </a:lnSpc>
+              <a:spcBef>
+                <a:spcPct val="0"/>
+              </a:spcBef>
+              <a:buNone/>
+              <a:defRPr sz="4400" kern="1200">
+                <a:solidFill>
+                  <a:schemeClr val="tx1"/>
+                </a:solidFill>
+                <a:latin typeface="+mj-lt"/>
+                <a:ea typeface="+mj-ea"/>
+                <a:cs typeface="+mj-cs"/>
+              </a:defRPr>
+            </a:lvl1pPr>
+          </a:lstStyle>
+          <a:p>
+            <a:r>
+              <a:rPr lang="en-US" smtClean="0"/>
+              <a:t>Gerenciamento de </a:t>
+            </a:r>
+            <a:br>
+              <a:rPr lang="en-US" smtClean="0"/>
+            </a:br>
+            <a:r>
+              <a:rPr lang="en-US" smtClean="0"/>
+              <a:t>Requisitos</a:t>
+            </a:r>
+            <a:br>
+              <a:rPr lang="en-US" smtClean="0"/>
+            </a:br>
+            <a:r>
+              <a:rPr lang="en-US" sz="3200" i="1" smtClean="0"/>
+              <a:t>Maturidade Nível 2</a:t>
+            </a:r>
+            <a:endParaRPr lang="en-US" sz="3200" i="1" dirty="0"/>
+          </a:p>
+        </p:txBody>
+      </p:sp>
+      <p:sp>
+        <p:nvSpPr>
+          <p:cNvPr id="17" name="TextBox 16"/>
+          <p:cNvSpPr txBox="1"/>
+          <p:nvPr/>
+        </p:nvSpPr>
+        <p:spPr>
+          <a:xfrm>
+            <a:off x="-229551" y="2242702"/>
+            <a:ext cx="2425890" cy="1200329"/>
+          </a:xfrm>
+          <a:prstGeom prst="rect">
+            <a:avLst/>
+          </a:prstGeom>
+          <a:noFill/>
+        </p:spPr>
+        <p:txBody>
+          <a:bodyPr wrap="square" rtlCol="0">
+            <a:spAutoFit/>
+          </a:bodyPr>
+          <a:lstStyle/>
+          <a:p>
+            <a:pPr algn="ctr"/>
+            <a:r>
+              <a:rPr lang="en-US" dirty="0" err="1" smtClean="0"/>
+              <a:t>Assegurar</a:t>
             </a:r>
             <a:r>
-              <a:rPr lang="pt-BR" dirty="0" smtClean="0"/>
-              <a:t>.”</a:t>
+              <a:rPr lang="en-US" dirty="0" smtClean="0"/>
+              <a:t> </a:t>
+            </a:r>
+          </a:p>
+          <a:p>
+            <a:pPr algn="ctr"/>
+            <a:r>
+              <a:rPr lang="en-US" dirty="0" err="1" smtClean="0"/>
+              <a:t>alinhamento</a:t>
+            </a:r>
+            <a:r>
+              <a:rPr lang="en-US" dirty="0" smtClean="0"/>
+              <a:t> entre </a:t>
+            </a:r>
+            <a:r>
+              <a:rPr lang="en-US" dirty="0" err="1" smtClean="0"/>
+              <a:t>requisitos</a:t>
+            </a:r>
+            <a:r>
+              <a:rPr lang="en-US" dirty="0" smtClean="0"/>
+              <a:t> </a:t>
+            </a:r>
+            <a:r>
+              <a:rPr lang="en-US" dirty="0" smtClean="0"/>
+              <a:t>e </a:t>
+            </a:r>
+            <a:r>
+              <a:rPr lang="en-US" dirty="0" smtClean="0"/>
+              <a:t>o</a:t>
+            </a:r>
+          </a:p>
+          <a:p>
+            <a:pPr algn="ctr"/>
+            <a:r>
+              <a:rPr lang="en-US" dirty="0" smtClean="0"/>
+              <a:t> </a:t>
+            </a:r>
+            <a:r>
+              <a:rPr lang="en-US" dirty="0" err="1" smtClean="0"/>
+              <a:t>plano</a:t>
+            </a:r>
+            <a:r>
+              <a:rPr lang="en-US" dirty="0" smtClean="0"/>
+              <a:t> </a:t>
+            </a:r>
+            <a:r>
+              <a:rPr lang="en-US" dirty="0" smtClean="0"/>
+              <a:t>do </a:t>
+            </a:r>
+            <a:r>
+              <a:rPr lang="en-US" dirty="0" err="1" smtClean="0"/>
+              <a:t>projeto</a:t>
             </a:r>
             <a:endParaRPr lang="en-US" dirty="0"/>
           </a:p>
@@ -32328,70 +32335,6 @@
           </a:p>
         </p:txBody>
       </p:sp>
-      <p:sp>
-        <p:nvSpPr>
-          <p:cNvPr id="4" name="Title 3"/>
-          <p:cNvSpPr>
-            <a:spLocks noGrp="1"/>
-          </p:cNvSpPr>
-          <p:nvPr>
-            <p:ph type="title"/>
-          </p:nvPr>
-        </p:nvSpPr>
-        <p:spPr>
-          <a:xfrm>
-            <a:off x="6405860" y="0"/>
-            <a:ext cx="5998128" cy="2057439"/>
-          </a:xfrm>
-        </p:spPr>
-        <p:txBody>
-          <a:bodyPr>
-            <a:noAutofit/>
-          </a:bodyPr>
-          <a:lstStyle/>
-          <a:p>
-            <a:r>
-              <a:rPr lang="en-US" sz="5400" dirty="0" err="1" smtClean="0"/>
-              <a:t>Gerencimaneto</a:t>
-            </a:r>
-            <a:r>
-              <a:rPr lang="en-US" sz="5400" dirty="0" smtClean="0"/>
-              <a:t> de </a:t>
-            </a:r>
-            <a:br>
-              <a:rPr lang="en-US" sz="5400" dirty="0" smtClean="0"/>
-            </a:br>
-            <a:r>
-              <a:rPr lang="en-US" sz="5400" dirty="0" err="1" smtClean="0"/>
-              <a:t>Requerimentos</a:t>
-            </a:r>
-            <a:r>
-              <a:rPr lang="en-US" sz="5400" dirty="0" smtClean="0"/>
-              <a:t/>
-            </a:r>
-            <a:br>
-              <a:rPr lang="en-US" sz="5400" dirty="0" smtClean="0"/>
-            </a:br>
-            <a:r>
-              <a:rPr lang="en-US" sz="4000" i="1" dirty="0" err="1" smtClean="0"/>
-              <a:t>Maturidade</a:t>
-            </a:r>
-            <a:r>
-              <a:rPr lang="en-US" sz="4000" i="1" dirty="0" smtClean="0"/>
-              <a:t> </a:t>
-            </a:r>
-            <a:r>
-              <a:rPr lang="en-US" sz="4000" i="1" dirty="0" err="1" smtClean="0"/>
-              <a:t>Nível</a:t>
-            </a:r>
-            <a:r>
-              <a:rPr lang="en-US" sz="4000" i="1" dirty="0" smtClean="0"/>
-              <a:t> 2</a:t>
-            </a:r>
-            <a:endParaRPr lang="en-US" sz="4000" i="1" dirty="0"/>
-          </a:p>
-        </p:txBody>
-      </p:sp>
       <p:grpSp>
         <p:nvGrpSpPr>
           <p:cNvPr id="6" name="Group 5"/>
@@ -32470,7 +32413,7 @@
                     <a:schemeClr val="bg1"/>
                   </a:solidFill>
                 </a:rPr>
-                <a:t>Requerimentos</a:t>
+                <a:t>requisitos</a:t>
               </a:r>
               <a:endParaRPr lang="en-US" sz="2000" b="1" dirty="0">
                 <a:solidFill>
@@ -32511,12 +32454,8 @@
             <a:p>
               <a:pPr algn="ctr"/>
               <a:r>
-                <a:rPr lang="pt-BR" dirty="0"/>
-                <a:t>r</a:t>
-              </a:r>
-              <a:r>
                 <a:rPr lang="pt-BR" dirty="0" smtClean="0"/>
-                <a:t>equerimentos</a:t>
+                <a:t>requisitos</a:t>
               </a:r>
               <a:endParaRPr lang="en-US" dirty="0"/>
             </a:p>
@@ -32577,7 +32516,7 @@
               <a:pPr algn="ctr"/>
               <a:r>
                 <a:rPr lang="pt-BR" dirty="0" smtClean="0"/>
-                <a:t>requerimentos</a:t>
+                <a:t>requisitos</a:t>
               </a:r>
               <a:endParaRPr lang="en-US" dirty="0"/>
             </a:p>
@@ -32624,7 +32563,7 @@
               </a:r>
               <a:r>
                 <a:rPr lang="en-US" sz="1900" dirty="0" err="1" smtClean="0"/>
-                <a:t>requerimentos</a:t>
+                <a:t>requisitos</a:t>
               </a:r>
               <a:endParaRPr lang="en-US" sz="1900" dirty="0"/>
             </a:p>
@@ -32688,77 +32627,7 @@
               </a:r>
               <a:r>
                 <a:rPr lang="en-US" dirty="0" err="1" smtClean="0"/>
-                <a:t>requerimentos</a:t>
-              </a:r>
-              <a:endParaRPr lang="en-US" dirty="0"/>
-            </a:p>
-          </p:txBody>
-        </p:sp>
-        <p:sp>
-          <p:nvSpPr>
-            <p:cNvPr id="29" name="TextBox 28"/>
-            <p:cNvSpPr txBox="1"/>
-            <p:nvPr/>
-          </p:nvSpPr>
-          <p:spPr>
-            <a:xfrm>
-              <a:off x="4946456" y="2165834"/>
-              <a:ext cx="2425890" cy="1200329"/>
-            </a:xfrm>
-            <a:prstGeom prst="rect">
-              <a:avLst/>
-            </a:prstGeom>
-            <a:noFill/>
-          </p:spPr>
-          <p:txBody>
-            <a:bodyPr wrap="square" rtlCol="0">
-              <a:spAutoFit/>
-            </a:bodyPr>
-            <a:lstStyle/>
-            <a:p>
-              <a:pPr algn="ctr"/>
-              <a:r>
-                <a:rPr lang="en-US" dirty="0" err="1" smtClean="0"/>
-                <a:t>Assegurar</a:t>
-              </a:r>
-              <a:r>
-                <a:rPr lang="en-US" dirty="0" smtClean="0"/>
-                <a:t> </a:t>
-              </a:r>
-            </a:p>
-            <a:p>
-              <a:pPr algn="ctr"/>
-              <a:r>
-                <a:rPr lang="en-US" dirty="0" err="1" smtClean="0"/>
-                <a:t>alinhamento</a:t>
-              </a:r>
-              <a:r>
-                <a:rPr lang="en-US" dirty="0" smtClean="0"/>
-                <a:t> entre </a:t>
-              </a:r>
-              <a:r>
-                <a:rPr lang="en-US" dirty="0" err="1" smtClean="0"/>
-                <a:t>requerimentos</a:t>
-              </a:r>
-              <a:r>
-                <a:rPr lang="en-US" dirty="0"/>
-                <a:t> </a:t>
-              </a:r>
-              <a:r>
-                <a:rPr lang="en-US" dirty="0" smtClean="0"/>
-                <a:t>e o </a:t>
-              </a:r>
-              <a:r>
-                <a:rPr lang="en-US" dirty="0" err="1" smtClean="0"/>
-                <a:t>plano</a:t>
-              </a:r>
-              <a:r>
-                <a:rPr lang="en-US" dirty="0" smtClean="0"/>
-                <a:t> do </a:t>
-              </a:r>
-              <a:r>
-                <a:rPr lang="en-US" dirty="0" err="1" smtClean="0"/>
-                <a:t>projeto</a:t>
+                <a:t>requisitos</a:t>
               </a:r>
               <a:endParaRPr lang="en-US" dirty="0"/>
             </a:p>
@@ -32789,11 +32658,7 @@
           <a:p>
             <a:r>
               <a:rPr lang="pt-BR" i="1" dirty="0" smtClean="0"/>
-              <a:t>2014 </a:t>
-            </a:r>
-            <a:r>
-              <a:rPr lang="pt-BR" i="1" dirty="0" smtClean="0"/>
-              <a:t>– 2TDSB – FIAP – SP/São Paulo</a:t>
+              <a:t>2014 – 2TDSB – FIAP – SP/São Paulo</a:t>
             </a:r>
             <a:endParaRPr lang="en-US" i="1" dirty="0"/>
           </a:p>
@@ -32808,7 +32673,7 @@
         <p:spPr>
           <a:xfrm>
             <a:off x="6892268" y="2242702"/>
-            <a:ext cx="5134891" cy="1200329"/>
+            <a:ext cx="5134891" cy="1477328"/>
           </a:xfrm>
           <a:prstGeom prst="rect">
             <a:avLst/>
@@ -32828,12 +32693,166 @@
           </a:p>
           <a:p>
             <a:r>
-              <a:rPr lang="pt-BR" dirty="0"/>
-              <a:t>"Lorem ipsum dolor sit amet, consectetur adipisicing elit, sed do eiusmod tempor incididunt ut labore et dolore magna aliqua</a:t>
+              <a:rPr lang="en-US" b="1" i="1" dirty="0"/>
+              <a:t>Maintain bidirectional traceability among requirements and work products. </a:t>
+            </a:r>
+            <a:endParaRPr lang="en-US" b="1" i="1" dirty="0" smtClean="0"/>
+          </a:p>
+          <a:p>
+            <a:endParaRPr lang="en-US" b="1" i="1" dirty="0" smtClean="0"/>
+          </a:p>
+          <a:p>
+            <a:r>
+              <a:rPr lang="pt-BR" b="1" i="1" dirty="0" smtClean="0"/>
+              <a:t>Manter</a:t>
+            </a:r>
+            <a:endParaRPr lang="en-US" dirty="0"/>
+          </a:p>
+        </p:txBody>
+      </p:sp>
+      <p:sp>
+        <p:nvSpPr>
+          <p:cNvPr id="16" name="Title 3"/>
+          <p:cNvSpPr txBox="1">
+            <a:spLocks/>
+          </p:cNvSpPr>
+          <p:nvPr/>
+        </p:nvSpPr>
+        <p:spPr>
+          <a:xfrm>
+            <a:off x="7446636" y="-211436"/>
+            <a:ext cx="5998128" cy="2057439"/>
+          </a:xfrm>
+          <a:prstGeom prst="rect">
+            <a:avLst/>
+          </a:prstGeom>
+        </p:spPr>
+        <p:txBody>
+          <a:bodyPr vert="horz" lIns="91440" tIns="45720" rIns="91440" bIns="45720" rtlCol="0" anchor="ctr">
+            <a:noAutofit/>
+          </a:bodyPr>
+          <a:lstStyle>
+            <a:lvl1pPr algn="l" defTabSz="914400" rtl="0" eaLnBrk="1" latinLnBrk="0" hangingPunct="1">
+              <a:lnSpc>
+                <a:spcPct val="90000"/>
+              </a:lnSpc>
+              <a:spcBef>
+                <a:spcPct val="0"/>
+              </a:spcBef>
+              <a:buNone/>
+              <a:defRPr sz="4400" kern="1200">
+                <a:solidFill>
+                  <a:schemeClr val="tx1"/>
+                </a:solidFill>
+                <a:latin typeface="+mj-lt"/>
+                <a:ea typeface="+mj-ea"/>
+                <a:cs typeface="+mj-cs"/>
+              </a:defRPr>
+            </a:lvl1pPr>
+          </a:lstStyle>
+          <a:p>
+            <a:r>
+              <a:rPr lang="en-US" smtClean="0"/>
+              <a:t>Gerenciamento de </a:t>
+            </a:r>
+            <a:br>
+              <a:rPr lang="en-US" smtClean="0"/>
+            </a:br>
+            <a:r>
+              <a:rPr lang="en-US" smtClean="0"/>
+              <a:t>Requisitos</a:t>
+            </a:r>
+            <a:br>
+              <a:rPr lang="en-US" smtClean="0"/>
+            </a:br>
+            <a:r>
+              <a:rPr lang="en-US" sz="3200" i="1" smtClean="0"/>
+              <a:t>Maturidade Nível 2</a:t>
+            </a:r>
+            <a:endParaRPr lang="en-US" sz="3200" i="1" dirty="0"/>
+          </a:p>
+        </p:txBody>
+      </p:sp>
+      <p:sp>
+        <p:nvSpPr>
+          <p:cNvPr id="17" name="TextBox 16"/>
+          <p:cNvSpPr txBox="1"/>
+          <p:nvPr/>
+        </p:nvSpPr>
+        <p:spPr>
+          <a:xfrm>
+            <a:off x="-229551" y="2242702"/>
+            <a:ext cx="2425890" cy="1200329"/>
+          </a:xfrm>
+          <a:prstGeom prst="rect">
+            <a:avLst/>
+          </a:prstGeom>
+          <a:noFill/>
+        </p:spPr>
+        <p:txBody>
+          <a:bodyPr wrap="square" rtlCol="0">
+            <a:spAutoFit/>
+          </a:bodyPr>
+          <a:lstStyle/>
+          <a:p>
+            <a:pPr algn="ctr"/>
+            <a:r>
+              <a:rPr lang="en-US" dirty="0" err="1" smtClean="0"/>
+              <a:t>Assegurar</a:t>
             </a:r>
             <a:r>
-              <a:rPr lang="pt-BR" dirty="0" smtClean="0"/>
-              <a:t>.”</a:t>
+              <a:rPr lang="en-US" dirty="0" smtClean="0"/>
+              <a:t> </a:t>
+            </a:r>
+          </a:p>
+          <a:p>
+            <a:pPr algn="ctr"/>
+            <a:r>
+              <a:rPr lang="en-US" dirty="0" err="1" smtClean="0"/>
+              <a:t>alinhamento</a:t>
+            </a:r>
+            <a:r>
+              <a:rPr lang="en-US" dirty="0" smtClean="0"/>
+              <a:t> entre </a:t>
+            </a:r>
+            <a:r>
+              <a:rPr lang="en-US" dirty="0" err="1" smtClean="0"/>
+              <a:t>requisitos</a:t>
+            </a:r>
+            <a:r>
+              <a:rPr lang="en-US" dirty="0" smtClean="0"/>
+              <a:t> </a:t>
+            </a:r>
+            <a:r>
+              <a:rPr lang="en-US" dirty="0" smtClean="0"/>
+              <a:t>e </a:t>
+            </a:r>
+            <a:r>
+              <a:rPr lang="en-US" dirty="0" smtClean="0"/>
+              <a:t>o</a:t>
+            </a:r>
+          </a:p>
+          <a:p>
+            <a:pPr algn="ctr"/>
+            <a:r>
+              <a:rPr lang="en-US" dirty="0" smtClean="0"/>
+              <a:t> </a:t>
+            </a:r>
+            <a:r>
+              <a:rPr lang="en-US" dirty="0" err="1" smtClean="0"/>
+              <a:t>plano</a:t>
+            </a:r>
+            <a:r>
+              <a:rPr lang="en-US" dirty="0" smtClean="0"/>
+              <a:t> </a:t>
+            </a:r>
+            <a:r>
+              <a:rPr lang="en-US" dirty="0" smtClean="0"/>
+              <a:t>do </a:t>
+            </a:r>
+            <a:r>
+              <a:rPr lang="en-US" dirty="0" err="1" smtClean="0"/>
+              <a:t>projeto</a:t>
             </a:r>
             <a:endParaRPr lang="en-US" dirty="0"/>
           </a:p>
@@ -32933,70 +32952,6 @@
           </a:p>
         </p:txBody>
       </p:sp>
-      <p:sp>
-        <p:nvSpPr>
-          <p:cNvPr id="4" name="Title 3"/>
-          <p:cNvSpPr>
-            <a:spLocks noGrp="1"/>
-          </p:cNvSpPr>
-          <p:nvPr>
-            <p:ph type="title"/>
-          </p:nvPr>
-        </p:nvSpPr>
-        <p:spPr>
-          <a:xfrm>
-            <a:off x="6405860" y="0"/>
-            <a:ext cx="5998128" cy="2057439"/>
-          </a:xfrm>
-        </p:spPr>
-        <p:txBody>
-          <a:bodyPr>
-            <a:noAutofit/>
-          </a:bodyPr>
-          <a:lstStyle/>
-          <a:p>
-            <a:r>
-              <a:rPr lang="en-US" sz="5400" dirty="0" err="1" smtClean="0"/>
-              <a:t>Gerencimaneto</a:t>
-            </a:r>
-            <a:r>
-              <a:rPr lang="en-US" sz="5400" dirty="0" smtClean="0"/>
-              <a:t> de </a:t>
-            </a:r>
-            <a:br>
-              <a:rPr lang="en-US" sz="5400" dirty="0" smtClean="0"/>
-            </a:br>
-            <a:r>
-              <a:rPr lang="en-US" sz="5400" dirty="0" err="1" smtClean="0"/>
-              <a:t>Requerimentos</a:t>
-            </a:r>
-            <a:r>
-              <a:rPr lang="en-US" sz="5400" dirty="0" smtClean="0"/>
-              <a:t/>
-            </a:r>
-            <a:br>
-              <a:rPr lang="en-US" sz="5400" dirty="0" smtClean="0"/>
-            </a:br>
-            <a:r>
-              <a:rPr lang="en-US" sz="4000" i="1" dirty="0" err="1" smtClean="0"/>
-              <a:t>Maturidade</a:t>
-            </a:r>
-            <a:r>
-              <a:rPr lang="en-US" sz="4000" i="1" dirty="0" smtClean="0"/>
-              <a:t> </a:t>
-            </a:r>
-            <a:r>
-              <a:rPr lang="en-US" sz="4000" i="1" dirty="0" err="1" smtClean="0"/>
-              <a:t>Nível</a:t>
-            </a:r>
-            <a:r>
-              <a:rPr lang="en-US" sz="4000" i="1" dirty="0" smtClean="0"/>
-              <a:t> 2</a:t>
-            </a:r>
-            <a:endParaRPr lang="en-US" sz="4000" i="1" dirty="0"/>
-          </a:p>
-        </p:txBody>
-      </p:sp>
       <p:grpSp>
         <p:nvGrpSpPr>
           <p:cNvPr id="6" name="Group 5"/>
@@ -33075,7 +33030,7 @@
                     <a:schemeClr val="bg1"/>
                   </a:solidFill>
                 </a:rPr>
-                <a:t>Requerimentos</a:t>
+                <a:t>requisitos</a:t>
               </a:r>
               <a:endParaRPr lang="en-US" sz="2000" b="1" dirty="0">
                 <a:solidFill>
@@ -33116,12 +33071,8 @@
             <a:p>
               <a:pPr algn="ctr"/>
               <a:r>
-                <a:rPr lang="pt-BR" dirty="0"/>
-                <a:t>r</a:t>
-              </a:r>
-              <a:r>
                 <a:rPr lang="pt-BR" dirty="0" smtClean="0"/>
-                <a:t>equerimentos</a:t>
+                <a:t>requisitos</a:t>
               </a:r>
               <a:endParaRPr lang="en-US" dirty="0"/>
             </a:p>
@@ -33182,7 +33133,7 @@
               <a:pPr algn="ctr"/>
               <a:r>
                 <a:rPr lang="pt-BR" dirty="0" smtClean="0"/>
-                <a:t>requerimentos</a:t>
+                <a:t>requisitos</a:t>
               </a:r>
               <a:endParaRPr lang="en-US" dirty="0"/>
             </a:p>
@@ -33229,7 +33180,7 @@
               </a:r>
               <a:r>
                 <a:rPr lang="en-US" sz="1900" dirty="0" err="1" smtClean="0"/>
-                <a:t>requerimentos</a:t>
+                <a:t>requisitos</a:t>
               </a:r>
               <a:endParaRPr lang="en-US" sz="1900" dirty="0"/>
             </a:p>
@@ -33293,77 +33244,7 @@
               </a:r>
               <a:r>
                 <a:rPr lang="en-US" dirty="0" err="1" smtClean="0"/>
-                <a:t>requerimentos</a:t>
-              </a:r>
-              <a:endParaRPr lang="en-US" dirty="0"/>
-            </a:p>
-          </p:txBody>
-        </p:sp>
-        <p:sp>
-          <p:nvSpPr>
-            <p:cNvPr id="29" name="TextBox 28"/>
-            <p:cNvSpPr txBox="1"/>
-            <p:nvPr/>
-          </p:nvSpPr>
-          <p:spPr>
-            <a:xfrm>
-              <a:off x="4946456" y="2165834"/>
-              <a:ext cx="2425890" cy="1200329"/>
-            </a:xfrm>
-            <a:prstGeom prst="rect">
-              <a:avLst/>
-            </a:prstGeom>
-            <a:noFill/>
-          </p:spPr>
-          <p:txBody>
-            <a:bodyPr wrap="square" rtlCol="0">
-              <a:spAutoFit/>
-            </a:bodyPr>
-            <a:lstStyle/>
-            <a:p>
-              <a:pPr algn="ctr"/>
-              <a:r>
-                <a:rPr lang="en-US" dirty="0" err="1" smtClean="0"/>
-                <a:t>Assegurar</a:t>
-              </a:r>
-              <a:r>
-                <a:rPr lang="en-US" dirty="0" smtClean="0"/>
-                <a:t> </a:t>
-              </a:r>
-            </a:p>
-            <a:p>
-              <a:pPr algn="ctr"/>
-              <a:r>
-                <a:rPr lang="en-US" dirty="0" err="1" smtClean="0"/>
-                <a:t>alinhamento</a:t>
-              </a:r>
-              <a:r>
-                <a:rPr lang="en-US" dirty="0" smtClean="0"/>
-                <a:t> entre </a:t>
-              </a:r>
-              <a:r>
-                <a:rPr lang="en-US" dirty="0" err="1" smtClean="0"/>
-                <a:t>requerimentos</a:t>
-              </a:r>
-              <a:r>
-                <a:rPr lang="en-US" dirty="0"/>
-                <a:t> </a:t>
-              </a:r>
-              <a:r>
-                <a:rPr lang="en-US" dirty="0" smtClean="0"/>
-                <a:t>e o </a:t>
-              </a:r>
-              <a:r>
-                <a:rPr lang="en-US" dirty="0" err="1" smtClean="0"/>
-                <a:t>plano</a:t>
-              </a:r>
-              <a:r>
-                <a:rPr lang="en-US" dirty="0" smtClean="0"/>
-                <a:t> do </a:t>
-              </a:r>
-              <a:r>
-                <a:rPr lang="en-US" dirty="0" err="1" smtClean="0"/>
-                <a:t>projeto</a:t>
+                <a:t>requisitos</a:t>
               </a:r>
               <a:endParaRPr lang="en-US" dirty="0"/>
             </a:p>
@@ -33394,11 +33275,7 @@
           <a:p>
             <a:r>
               <a:rPr lang="pt-BR" i="1" dirty="0" smtClean="0"/>
-              <a:t>2014 </a:t>
-            </a:r>
-            <a:r>
-              <a:rPr lang="pt-BR" i="1" dirty="0" smtClean="0"/>
-              <a:t>– 2TDSB – FIAP – SP/São Paulo</a:t>
+              <a:t>2014 – 2TDSB – FIAP – SP/São Paulo</a:t>
             </a:r>
             <a:endParaRPr lang="en-US" i="1" dirty="0"/>
           </a:p>
@@ -33439,6 +33316,154 @@
             <a:r>
               <a:rPr lang="pt-BR" dirty="0" smtClean="0"/>
               <a:t>.”</a:t>
+            </a:r>
+            <a:endParaRPr lang="en-US" dirty="0"/>
+          </a:p>
+        </p:txBody>
+      </p:sp>
+      <p:sp>
+        <p:nvSpPr>
+          <p:cNvPr id="16" name="Title 3"/>
+          <p:cNvSpPr txBox="1">
+            <a:spLocks/>
+          </p:cNvSpPr>
+          <p:nvPr/>
+        </p:nvSpPr>
+        <p:spPr>
+          <a:xfrm>
+            <a:off x="7446636" y="-211436"/>
+            <a:ext cx="5998128" cy="2057439"/>
+          </a:xfrm>
+          <a:prstGeom prst="rect">
+            <a:avLst/>
+          </a:prstGeom>
+        </p:spPr>
+        <p:txBody>
+          <a:bodyPr vert="horz" lIns="91440" tIns="45720" rIns="91440" bIns="45720" rtlCol="0" anchor="ctr">
+            <a:noAutofit/>
+          </a:bodyPr>
+          <a:lstStyle>
+            <a:lvl1pPr algn="l" defTabSz="914400" rtl="0" eaLnBrk="1" latinLnBrk="0" hangingPunct="1">
+              <a:lnSpc>
+                <a:spcPct val="90000"/>
+              </a:lnSpc>
+              <a:spcBef>
+                <a:spcPct val="0"/>
+              </a:spcBef>
+              <a:buNone/>
+              <a:defRPr sz="4400" kern="1200">
+                <a:solidFill>
+                  <a:schemeClr val="tx1"/>
+                </a:solidFill>
+                <a:latin typeface="+mj-lt"/>
+                <a:ea typeface="+mj-ea"/>
+                <a:cs typeface="+mj-cs"/>
+              </a:defRPr>
+            </a:lvl1pPr>
+          </a:lstStyle>
+          <a:p>
+            <a:r>
+              <a:rPr lang="en-US" smtClean="0"/>
+              <a:t>Gerenciamento de </a:t>
+            </a:r>
+            <a:br>
+              <a:rPr lang="en-US" smtClean="0"/>
+            </a:br>
+            <a:r>
+              <a:rPr lang="en-US" smtClean="0"/>
+              <a:t>Requisitos</a:t>
+            </a:r>
+            <a:br>
+              <a:rPr lang="en-US" smtClean="0"/>
+            </a:br>
+            <a:r>
+              <a:rPr lang="en-US" sz="3200" i="1" smtClean="0"/>
+              <a:t>Maturidade Nível 2</a:t>
+            </a:r>
+            <a:endParaRPr lang="en-US" sz="3200" i="1" dirty="0"/>
+          </a:p>
+        </p:txBody>
+      </p:sp>
+      <p:sp>
+        <p:nvSpPr>
+          <p:cNvPr id="17" name="TextBox 16"/>
+          <p:cNvSpPr txBox="1"/>
+          <p:nvPr/>
+        </p:nvSpPr>
+        <p:spPr>
+          <a:xfrm>
+            <a:off x="-229551" y="2242702"/>
+            <a:ext cx="2425890" cy="1200329"/>
+          </a:xfrm>
+          <a:prstGeom prst="rect">
+            <a:avLst/>
+          </a:prstGeom>
+          <a:noFill/>
+        </p:spPr>
+        <p:txBody>
+          <a:bodyPr wrap="square" rtlCol="0">
+            <a:spAutoFit/>
+          </a:bodyPr>
+          <a:lstStyle/>
+          <a:p>
+            <a:pPr algn="ctr"/>
+            <a:r>
+              <a:rPr lang="en-US" dirty="0" err="1" smtClean="0"/>
+              <a:t>Assegurar</a:t>
+            </a:r>
+            <a:r>
+              <a:rPr lang="en-US" dirty="0" smtClean="0"/>
+              <a:t> </a:t>
+            </a:r>
+          </a:p>
+          <a:p>
+            <a:pPr algn="ctr"/>
+            <a:r>
+              <a:rPr lang="en-US" dirty="0" err="1" smtClean="0"/>
+              <a:t>alinhamento</a:t>
+            </a:r>
+            <a:r>
+              <a:rPr lang="en-US" dirty="0" smtClean="0"/>
+              <a:t> entre </a:t>
+            </a:r>
+            <a:r>
+              <a:rPr lang="en-US" dirty="0" err="1" smtClean="0"/>
+              <a:t>requisitos</a:t>
+            </a:r>
+            <a:r>
+              <a:rPr lang="en-US" dirty="0" smtClean="0"/>
+              <a:t> </a:t>
+            </a:r>
+            <a:r>
+              <a:rPr lang="en-US" dirty="0" smtClean="0"/>
+              <a:t>e </a:t>
+            </a:r>
+            <a:r>
+              <a:rPr lang="en-US" dirty="0" smtClean="0"/>
+              <a:t>o</a:t>
+            </a:r>
+          </a:p>
+          <a:p>
+            <a:pPr algn="ctr"/>
+            <a:r>
+              <a:rPr lang="en-US" dirty="0" smtClean="0"/>
+              <a:t> </a:t>
+            </a:r>
+            <a:r>
+              <a:rPr lang="en-US" dirty="0" err="1" smtClean="0"/>
+              <a:t>plano</a:t>
+            </a:r>
+            <a:r>
+              <a:rPr lang="en-US" dirty="0" smtClean="0"/>
+              <a:t> </a:t>
+            </a:r>
+            <a:r>
+              <a:rPr lang="en-US" dirty="0" smtClean="0"/>
+              <a:t>do </a:t>
+            </a:r>
+            <a:r>
+              <a:rPr lang="en-US" dirty="0" err="1" smtClean="0"/>
+              <a:t>projeto</a:t>
             </a:r>
             <a:endParaRPr lang="en-US" dirty="0"/>
           </a:p>
@@ -33538,70 +33563,6 @@
           </a:p>
         </p:txBody>
       </p:sp>
-      <p:sp>
-        <p:nvSpPr>
-          <p:cNvPr id="4" name="Title 3"/>
-          <p:cNvSpPr>
-            <a:spLocks noGrp="1"/>
-          </p:cNvSpPr>
-          <p:nvPr>
-            <p:ph type="title"/>
-          </p:nvPr>
-        </p:nvSpPr>
-        <p:spPr>
-          <a:xfrm>
-            <a:off x="6405860" y="0"/>
-            <a:ext cx="5998128" cy="2057439"/>
-          </a:xfrm>
-        </p:spPr>
-        <p:txBody>
-          <a:bodyPr>
-            <a:noAutofit/>
-          </a:bodyPr>
-          <a:lstStyle/>
-          <a:p>
-            <a:r>
-              <a:rPr lang="en-US" sz="5400" dirty="0" err="1" smtClean="0"/>
-              <a:t>Gerencimaneto</a:t>
-            </a:r>
-            <a:r>
-              <a:rPr lang="en-US" sz="5400" dirty="0" smtClean="0"/>
-              <a:t> de </a:t>
-            </a:r>
-            <a:br>
-              <a:rPr lang="en-US" sz="5400" dirty="0" smtClean="0"/>
-            </a:br>
-            <a:r>
-              <a:rPr lang="en-US" sz="5400" dirty="0" err="1" smtClean="0"/>
-              <a:t>Requerimentos</a:t>
-            </a:r>
-            <a:r>
-              <a:rPr lang="en-US" sz="5400" dirty="0" smtClean="0"/>
-              <a:t/>
-            </a:r>
-            <a:br>
-              <a:rPr lang="en-US" sz="5400" dirty="0" smtClean="0"/>
-            </a:br>
-            <a:r>
-              <a:rPr lang="en-US" sz="4000" i="1" dirty="0" err="1" smtClean="0"/>
-              <a:t>Maturidade</a:t>
-            </a:r>
-            <a:r>
-              <a:rPr lang="en-US" sz="4000" i="1" dirty="0" smtClean="0"/>
-              <a:t> </a:t>
-            </a:r>
-            <a:r>
-              <a:rPr lang="en-US" sz="4000" i="1" dirty="0" err="1" smtClean="0"/>
-              <a:t>Nível</a:t>
-            </a:r>
-            <a:r>
-              <a:rPr lang="en-US" sz="4000" i="1" dirty="0" smtClean="0"/>
-              <a:t> 2</a:t>
-            </a:r>
-            <a:endParaRPr lang="en-US" sz="4000" i="1" dirty="0"/>
-          </a:p>
-        </p:txBody>
-      </p:sp>
       <p:grpSp>
         <p:nvGrpSpPr>
           <p:cNvPr id="6" name="Group 5"/>
@@ -33680,7 +33641,7 @@
                     <a:schemeClr val="bg1"/>
                   </a:solidFill>
                 </a:rPr>
-                <a:t>Requerimentos</a:t>
+                <a:t>requisitos</a:t>
               </a:r>
               <a:endParaRPr lang="en-US" sz="2000" b="1" dirty="0">
                 <a:solidFill>
@@ -33721,12 +33682,8 @@
             <a:p>
               <a:pPr algn="ctr"/>
               <a:r>
-                <a:rPr lang="pt-BR" dirty="0"/>
-                <a:t>r</a:t>
-              </a:r>
-              <a:r>
                 <a:rPr lang="pt-BR" dirty="0" smtClean="0"/>
-                <a:t>equerimentos</a:t>
+                <a:t>requisitos</a:t>
               </a:r>
               <a:endParaRPr lang="en-US" dirty="0"/>
             </a:p>
@@ -33787,7 +33744,7 @@
               <a:pPr algn="ctr"/>
               <a:r>
                 <a:rPr lang="pt-BR" dirty="0" smtClean="0"/>
-                <a:t>requerimentos</a:t>
+                <a:t>requisitos</a:t>
               </a:r>
               <a:endParaRPr lang="en-US" dirty="0"/>
             </a:p>
@@ -33834,7 +33791,7 @@
               </a:r>
               <a:r>
                 <a:rPr lang="en-US" sz="1900" dirty="0" err="1" smtClean="0"/>
-                <a:t>requerimentos</a:t>
+                <a:t>requisitos</a:t>
               </a:r>
               <a:endParaRPr lang="en-US" sz="1900" dirty="0"/>
             </a:p>
@@ -33898,77 +33855,7 @@
               </a:r>
               <a:r>
                 <a:rPr lang="en-US" dirty="0" err="1" smtClean="0"/>
-                <a:t>requerimentos</a:t>
-              </a:r>
-              <a:endParaRPr lang="en-US" dirty="0"/>
-            </a:p>
-          </p:txBody>
-        </p:sp>
-        <p:sp>
-          <p:nvSpPr>
-            <p:cNvPr id="29" name="TextBox 28"/>
-            <p:cNvSpPr txBox="1"/>
-            <p:nvPr/>
-          </p:nvSpPr>
-          <p:spPr>
-            <a:xfrm>
-              <a:off x="4946456" y="2165834"/>
-              <a:ext cx="2425890" cy="1200329"/>
-            </a:xfrm>
-            <a:prstGeom prst="rect">
-              <a:avLst/>
-            </a:prstGeom>
-            <a:noFill/>
-          </p:spPr>
-          <p:txBody>
-            <a:bodyPr wrap="square" rtlCol="0">
-              <a:spAutoFit/>
-            </a:bodyPr>
-            <a:lstStyle/>
-            <a:p>
-              <a:pPr algn="ctr"/>
-              <a:r>
-                <a:rPr lang="en-US" dirty="0" err="1" smtClean="0"/>
-                <a:t>Assegurar</a:t>
-              </a:r>
-              <a:r>
-                <a:rPr lang="en-US" dirty="0" smtClean="0"/>
-                <a:t> </a:t>
-              </a:r>
-            </a:p>
-            <a:p>
-              <a:pPr algn="ctr"/>
-              <a:r>
-                <a:rPr lang="en-US" dirty="0" err="1" smtClean="0"/>
-                <a:t>alinhamento</a:t>
-              </a:r>
-              <a:r>
-                <a:rPr lang="en-US" dirty="0" smtClean="0"/>
-                <a:t> entre </a:t>
-              </a:r>
-              <a:r>
-                <a:rPr lang="en-US" dirty="0" err="1" smtClean="0"/>
-                <a:t>requerimentos</a:t>
-              </a:r>
-              <a:r>
-                <a:rPr lang="en-US" dirty="0"/>
-                <a:t> </a:t>
-              </a:r>
-              <a:r>
-                <a:rPr lang="en-US" dirty="0" smtClean="0"/>
-                <a:t>e o </a:t>
-              </a:r>
-              <a:r>
-                <a:rPr lang="en-US" dirty="0" err="1" smtClean="0"/>
-                <a:t>plano</a:t>
-              </a:r>
-              <a:r>
-                <a:rPr lang="en-US" dirty="0" smtClean="0"/>
-                <a:t> do </a:t>
-              </a:r>
-              <a:r>
-                <a:rPr lang="en-US" dirty="0" err="1" smtClean="0"/>
-                <a:t>projeto</a:t>
+                <a:t>requisitos</a:t>
               </a:r>
               <a:endParaRPr lang="en-US" dirty="0"/>
             </a:p>
@@ -33999,11 +33886,7 @@
           <a:p>
             <a:r>
               <a:rPr lang="pt-BR" i="1" dirty="0" smtClean="0"/>
-              <a:t>2014 </a:t>
-            </a:r>
-            <a:r>
-              <a:rPr lang="pt-BR" i="1" dirty="0" smtClean="0"/>
-              <a:t>– 2TDSB – FIAP – SP/São Paulo</a:t>
+              <a:t>2014 – 2TDSB – FIAP – SP/São Paulo</a:t>
             </a:r>
             <a:endParaRPr lang="en-US" i="1" dirty="0"/>
           </a:p>
@@ -34044,6 +33927,154 @@
             <a:r>
               <a:rPr lang="pt-BR" dirty="0"/>
               <a:t>ipsum dolor sit amet, consectetur adipisicing elit, sed do eiusmod tempor incididunt ut labore et dolore magna aliqua. Ut enim ad minim veniam, quis nostrud exercitation ullamco laboris nisi ut aliquip ex ea commodo consequat. Duis aute irure dolor in reprehenderit in voluptate velit esse cillum dolore eu fugiat nulla pariatur. Excepteur sint occaecat cupidatat non proident, sunt in culpa qui officia deserunt mollit anim id est laborum."</a:t>
+            </a:r>
+            <a:endParaRPr lang="en-US" dirty="0"/>
+          </a:p>
+        </p:txBody>
+      </p:sp>
+      <p:sp>
+        <p:nvSpPr>
+          <p:cNvPr id="16" name="Title 3"/>
+          <p:cNvSpPr txBox="1">
+            <a:spLocks/>
+          </p:cNvSpPr>
+          <p:nvPr/>
+        </p:nvSpPr>
+        <p:spPr>
+          <a:xfrm>
+            <a:off x="7446636" y="-211436"/>
+            <a:ext cx="5998128" cy="2057439"/>
+          </a:xfrm>
+          <a:prstGeom prst="rect">
+            <a:avLst/>
+          </a:prstGeom>
+        </p:spPr>
+        <p:txBody>
+          <a:bodyPr vert="horz" lIns="91440" tIns="45720" rIns="91440" bIns="45720" rtlCol="0" anchor="ctr">
+            <a:noAutofit/>
+          </a:bodyPr>
+          <a:lstStyle>
+            <a:lvl1pPr algn="l" defTabSz="914400" rtl="0" eaLnBrk="1" latinLnBrk="0" hangingPunct="1">
+              <a:lnSpc>
+                <a:spcPct val="90000"/>
+              </a:lnSpc>
+              <a:spcBef>
+                <a:spcPct val="0"/>
+              </a:spcBef>
+              <a:buNone/>
+              <a:defRPr sz="4400" kern="1200">
+                <a:solidFill>
+                  <a:schemeClr val="tx1"/>
+                </a:solidFill>
+                <a:latin typeface="+mj-lt"/>
+                <a:ea typeface="+mj-ea"/>
+                <a:cs typeface="+mj-cs"/>
+              </a:defRPr>
+            </a:lvl1pPr>
+          </a:lstStyle>
+          <a:p>
+            <a:r>
+              <a:rPr lang="en-US" smtClean="0"/>
+              <a:t>Gerenciamento de </a:t>
+            </a:r>
+            <a:br>
+              <a:rPr lang="en-US" smtClean="0"/>
+            </a:br>
+            <a:r>
+              <a:rPr lang="en-US" smtClean="0"/>
+              <a:t>Requisitos</a:t>
+            </a:r>
+            <a:br>
+              <a:rPr lang="en-US" smtClean="0"/>
+            </a:br>
+            <a:r>
+              <a:rPr lang="en-US" sz="3200" i="1" smtClean="0"/>
+              <a:t>Maturidade Nível 2</a:t>
+            </a:r>
+            <a:endParaRPr lang="en-US" sz="3200" i="1" dirty="0"/>
+          </a:p>
+        </p:txBody>
+      </p:sp>
+      <p:sp>
+        <p:nvSpPr>
+          <p:cNvPr id="17" name="TextBox 16"/>
+          <p:cNvSpPr txBox="1"/>
+          <p:nvPr/>
+        </p:nvSpPr>
+        <p:spPr>
+          <a:xfrm>
+            <a:off x="-229551" y="2242702"/>
+            <a:ext cx="2425890" cy="1200329"/>
+          </a:xfrm>
+          <a:prstGeom prst="rect">
+            <a:avLst/>
+          </a:prstGeom>
+          <a:noFill/>
+        </p:spPr>
+        <p:txBody>
+          <a:bodyPr wrap="square" rtlCol="0">
+            <a:spAutoFit/>
+          </a:bodyPr>
+          <a:lstStyle/>
+          <a:p>
+            <a:pPr algn="ctr"/>
+            <a:r>
+              <a:rPr lang="en-US" dirty="0" err="1" smtClean="0"/>
+              <a:t>Assegurar</a:t>
+            </a:r>
+            <a:r>
+              <a:rPr lang="en-US" dirty="0" smtClean="0"/>
+              <a:t> </a:t>
+            </a:r>
+          </a:p>
+          <a:p>
+            <a:pPr algn="ctr"/>
+            <a:r>
+              <a:rPr lang="en-US" dirty="0" err="1" smtClean="0"/>
+              <a:t>alinhamento</a:t>
+            </a:r>
+            <a:r>
+              <a:rPr lang="en-US" dirty="0" smtClean="0"/>
+              <a:t> entre </a:t>
+            </a:r>
+            <a:r>
+              <a:rPr lang="en-US" dirty="0" err="1" smtClean="0"/>
+              <a:t>requisitos</a:t>
+            </a:r>
+            <a:r>
+              <a:rPr lang="en-US" dirty="0" smtClean="0"/>
+              <a:t> </a:t>
+            </a:r>
+            <a:r>
+              <a:rPr lang="en-US" dirty="0" smtClean="0"/>
+              <a:t>e </a:t>
+            </a:r>
+            <a:r>
+              <a:rPr lang="en-US" dirty="0" smtClean="0"/>
+              <a:t>o</a:t>
+            </a:r>
+          </a:p>
+          <a:p>
+            <a:pPr algn="ctr"/>
+            <a:r>
+              <a:rPr lang="en-US" dirty="0" smtClean="0"/>
+              <a:t> </a:t>
+            </a:r>
+            <a:r>
+              <a:rPr lang="en-US" dirty="0" err="1" smtClean="0"/>
+              <a:t>plano</a:t>
+            </a:r>
+            <a:r>
+              <a:rPr lang="en-US" dirty="0" smtClean="0"/>
+              <a:t> </a:t>
+            </a:r>
+            <a:r>
+              <a:rPr lang="en-US" dirty="0" smtClean="0"/>
+              <a:t>do </a:t>
+            </a:r>
+            <a:r>
+              <a:rPr lang="en-US" dirty="0" err="1" smtClean="0"/>
+              <a:t>projeto</a:t>
             </a:r>
             <a:endParaRPr lang="en-US" dirty="0"/>
           </a:p>

</xml_diff>